<commit_message>
Update présentation groupe 1H.pptx
</commit_message>
<xml_diff>
--- a/présentation groupe 1H.pptx
+++ b/présentation groupe 1H.pptx
@@ -5,8 +5,7 @@
     <p:sldMasterId id="2147483854" r:id="rId1"/>
   </p:sldMasterIdLst>
   <p:sldIdLst>
-    <p:sldId id="256" r:id="rId2"/>
-    <p:sldId id="257" r:id="rId3"/>
+    <p:sldId id="257" r:id="rId2"/>
   </p:sldIdLst>
   <p:sldSz cx="21383625" cy="15119350"/>
   <p:notesSz cx="6858000" cy="9144000"/>
@@ -6023,14 +6022,6 @@
 <file path=ppt/slides/slide1.xml><?xml version="1.0" encoding="utf-8"?>
 <p:sld xmlns:a="http://schemas.openxmlformats.org/drawingml/2006/main" xmlns:r="http://schemas.openxmlformats.org/officeDocument/2006/relationships" xmlns:p="http://schemas.openxmlformats.org/presentationml/2006/main">
   <p:cSld>
-    <p:bg>
-      <p:bgPr>
-        <a:solidFill>
-          <a:schemeClr val="bg1"/>
-        </a:solidFill>
-        <a:effectLst/>
-      </p:bgPr>
-    </p:bg>
     <p:spTree>
       <p:nvGrpSpPr>
         <p:cNvPr id="1" name=""/>
@@ -6045,2513 +6036,6 @@
           <a:chExt cx="0" cy="0"/>
         </a:xfrm>
       </p:grpSpPr>
-      <p:cxnSp>
-        <p:nvCxnSpPr>
-          <p:cNvPr id="6" name="Connecteur droit 5">
-            <a:extLst>
-              <a:ext uri="{FF2B5EF4-FFF2-40B4-BE49-F238E27FC236}">
-                <a16:creationId xmlns:a16="http://schemas.microsoft.com/office/drawing/2014/main" id="{85DF817F-EEFC-4802-B3E2-DC57ABFBA72D}"/>
-              </a:ext>
-            </a:extLst>
-          </p:cNvPr>
-          <p:cNvCxnSpPr>
-            <a:cxnSpLocks/>
-            <a:endCxn id="4" idx="0"/>
-          </p:cNvCxnSpPr>
-          <p:nvPr/>
-        </p:nvCxnSpPr>
-        <p:spPr>
-          <a:xfrm>
-            <a:off x="10741280" y="60915"/>
-            <a:ext cx="65504" cy="5532046"/>
-          </a:xfrm>
-          <a:prstGeom prst="line">
-            <a:avLst/>
-          </a:prstGeom>
-        </p:spPr>
-        <p:style>
-          <a:lnRef idx="1">
-            <a:schemeClr val="dk1"/>
-          </a:lnRef>
-          <a:fillRef idx="0">
-            <a:schemeClr val="dk1"/>
-          </a:fillRef>
-          <a:effectRef idx="0">
-            <a:schemeClr val="dk1"/>
-          </a:effectRef>
-          <a:fontRef idx="minor">
-            <a:schemeClr val="tx1"/>
-          </a:fontRef>
-        </p:style>
-      </p:cxnSp>
-      <p:cxnSp>
-        <p:nvCxnSpPr>
-          <p:cNvPr id="11" name="Connecteur droit 10">
-            <a:extLst>
-              <a:ext uri="{FF2B5EF4-FFF2-40B4-BE49-F238E27FC236}">
-                <a16:creationId xmlns:a16="http://schemas.microsoft.com/office/drawing/2014/main" id="{5EB12A4A-C604-4FA5-90CD-B1DC4E4DF28B}"/>
-              </a:ext>
-            </a:extLst>
-          </p:cNvPr>
-          <p:cNvCxnSpPr>
-            <a:cxnSpLocks/>
-            <a:stCxn id="4" idx="4"/>
-          </p:cNvCxnSpPr>
-          <p:nvPr/>
-        </p:nvCxnSpPr>
-        <p:spPr>
-          <a:xfrm flipH="1">
-            <a:off x="10741282" y="11338560"/>
-            <a:ext cx="65502" cy="3841705"/>
-          </a:xfrm>
-          <a:prstGeom prst="line">
-            <a:avLst/>
-          </a:prstGeom>
-        </p:spPr>
-        <p:style>
-          <a:lnRef idx="1">
-            <a:schemeClr val="dk1"/>
-          </a:lnRef>
-          <a:fillRef idx="0">
-            <a:schemeClr val="dk1"/>
-          </a:fillRef>
-          <a:effectRef idx="0">
-            <a:schemeClr val="dk1"/>
-          </a:effectRef>
-          <a:fontRef idx="minor">
-            <a:schemeClr val="tx1"/>
-          </a:fontRef>
-        </p:style>
-      </p:cxnSp>
-      <p:sp>
-        <p:nvSpPr>
-          <p:cNvPr id="16" name="ZoneTexte 15">
-            <a:extLst>
-              <a:ext uri="{FF2B5EF4-FFF2-40B4-BE49-F238E27FC236}">
-                <a16:creationId xmlns:a16="http://schemas.microsoft.com/office/drawing/2014/main" id="{71A06923-E9ED-4F38-BAA1-BBA30DDD0A31}"/>
-              </a:ext>
-            </a:extLst>
-          </p:cNvPr>
-          <p:cNvSpPr txBox="1"/>
-          <p:nvPr/>
-        </p:nvSpPr>
-        <p:spPr>
-          <a:xfrm>
-            <a:off x="889961" y="475487"/>
-            <a:ext cx="9281621" cy="646331"/>
-          </a:xfrm>
-          <a:prstGeom prst="rect">
-            <a:avLst/>
-          </a:prstGeom>
-          <a:noFill/>
-        </p:spPr>
-        <p:txBody>
-          <a:bodyPr wrap="square" rtlCol="0">
-            <a:spAutoFit/>
-          </a:bodyPr>
-          <a:lstStyle/>
-          <a:p>
-            <a:pPr algn="ctr"/>
-            <a:r>
-              <a:rPr lang="fr-FR" sz="3600" dirty="0"/>
-              <a:t>Structure du projet</a:t>
-            </a:r>
-          </a:p>
-        </p:txBody>
-      </p:sp>
-      <p:pic>
-        <p:nvPicPr>
-          <p:cNvPr id="20" name="Image 19">
-            <a:extLst>
-              <a:ext uri="{FF2B5EF4-FFF2-40B4-BE49-F238E27FC236}">
-                <a16:creationId xmlns:a16="http://schemas.microsoft.com/office/drawing/2014/main" id="{E15483A9-6D96-411B-A731-12E920D1B771}"/>
-              </a:ext>
-            </a:extLst>
-          </p:cNvPr>
-          <p:cNvPicPr>
-            <a:picLocks noChangeAspect="1"/>
-          </p:cNvPicPr>
-          <p:nvPr/>
-        </p:nvPicPr>
-        <p:blipFill>
-          <a:blip r:embed="rId2"/>
-          <a:stretch>
-            <a:fillRect/>
-          </a:stretch>
-        </p:blipFill>
-        <p:spPr>
-          <a:xfrm>
-            <a:off x="11041508" y="1773235"/>
-            <a:ext cx="5759819" cy="4450503"/>
-          </a:xfrm>
-          <a:prstGeom prst="rect">
-            <a:avLst/>
-          </a:prstGeom>
-        </p:spPr>
-      </p:pic>
-      <p:sp>
-        <p:nvSpPr>
-          <p:cNvPr id="17" name="ZoneTexte 16">
-            <a:extLst>
-              <a:ext uri="{FF2B5EF4-FFF2-40B4-BE49-F238E27FC236}">
-                <a16:creationId xmlns:a16="http://schemas.microsoft.com/office/drawing/2014/main" id="{5CA0CE7D-CF1B-4C5E-8072-5B2AD7376CA2}"/>
-              </a:ext>
-            </a:extLst>
-          </p:cNvPr>
-          <p:cNvSpPr txBox="1"/>
-          <p:nvPr/>
-        </p:nvSpPr>
-        <p:spPr>
-          <a:xfrm>
-            <a:off x="12730136" y="475486"/>
-            <a:ext cx="6415296" cy="646331"/>
-          </a:xfrm>
-          <a:prstGeom prst="rect">
-            <a:avLst/>
-          </a:prstGeom>
-          <a:noFill/>
-        </p:spPr>
-        <p:txBody>
-          <a:bodyPr wrap="square" rtlCol="0">
-            <a:spAutoFit/>
-          </a:bodyPr>
-          <a:lstStyle/>
-          <a:p>
-            <a:pPr algn="ctr"/>
-            <a:r>
-              <a:rPr lang="fr-FR" sz="3600" dirty="0"/>
-              <a:t>Utilisation de l’application</a:t>
-            </a:r>
-          </a:p>
-        </p:txBody>
-      </p:sp>
-      <p:sp>
-        <p:nvSpPr>
-          <p:cNvPr id="21" name="ZoneTexte 20">
-            <a:extLst>
-              <a:ext uri="{FF2B5EF4-FFF2-40B4-BE49-F238E27FC236}">
-                <a16:creationId xmlns:a16="http://schemas.microsoft.com/office/drawing/2014/main" id="{271CB567-AC93-49D4-9A5B-316C26CB0F84}"/>
-              </a:ext>
-            </a:extLst>
-          </p:cNvPr>
-          <p:cNvSpPr txBox="1"/>
-          <p:nvPr/>
-        </p:nvSpPr>
-        <p:spPr>
-          <a:xfrm>
-            <a:off x="13750481" y="1289591"/>
-            <a:ext cx="5394951" cy="461665"/>
-          </a:xfrm>
-          <a:prstGeom prst="rect">
-            <a:avLst/>
-          </a:prstGeom>
-          <a:noFill/>
-        </p:spPr>
-        <p:txBody>
-          <a:bodyPr wrap="square" rtlCol="0">
-            <a:spAutoFit/>
-          </a:bodyPr>
-          <a:lstStyle/>
-          <a:p>
-            <a:pPr algn="ctr"/>
-            <a:r>
-              <a:rPr lang="fr-FR" sz="2400" u="sng" dirty="0"/>
-              <a:t>Gestion des produits</a:t>
-            </a:r>
-          </a:p>
-        </p:txBody>
-      </p:sp>
-      <p:graphicFrame>
-        <p:nvGraphicFramePr>
-          <p:cNvPr id="30" name="Tableau 29">
-            <a:extLst>
-              <a:ext uri="{FF2B5EF4-FFF2-40B4-BE49-F238E27FC236}">
-                <a16:creationId xmlns:a16="http://schemas.microsoft.com/office/drawing/2014/main" id="{43E54C59-C253-4087-896F-5F1320C82B75}"/>
-              </a:ext>
-            </a:extLst>
-          </p:cNvPr>
-          <p:cNvGraphicFramePr>
-            <a:graphicFrameLocks noGrp="1"/>
-          </p:cNvGraphicFramePr>
-          <p:nvPr>
-            <p:extLst>
-              <p:ext uri="{D42A27DB-BD31-4B8C-83A1-F6EECF244321}">
-                <p14:modId xmlns:p14="http://schemas.microsoft.com/office/powerpoint/2010/main" val="643069611"/>
-              </p:ext>
-            </p:extLst>
-          </p:nvPr>
-        </p:nvGraphicFramePr>
-        <p:xfrm>
-          <a:off x="308550" y="7090627"/>
-          <a:ext cx="1520120" cy="3432897"/>
-        </p:xfrm>
-        <a:graphic>
-          <a:graphicData uri="http://schemas.openxmlformats.org/drawingml/2006/table">
-            <a:tbl>
-              <a:tblPr firstRow="1" bandRow="1">
-                <a:tableStyleId>{5940675A-B579-460E-94D1-54222C63F5DA}</a:tableStyleId>
-              </a:tblPr>
-              <a:tblGrid>
-                <a:gridCol w="1520120">
-                  <a:extLst>
-                    <a:ext uri="{9D8B030D-6E8A-4147-A177-3AD203B41FA5}">
-                      <a16:colId xmlns:a16="http://schemas.microsoft.com/office/drawing/2014/main" val="4082210562"/>
-                    </a:ext>
-                  </a:extLst>
-                </a:gridCol>
-              </a:tblGrid>
-              <a:tr h="1144299">
-                <a:tc>
-                  <a:txBody>
-                    <a:bodyPr/>
-                    <a:lstStyle/>
-                    <a:p>
-                      <a:endParaRPr lang="fr-FR" dirty="0"/>
-                    </a:p>
-                  </a:txBody>
-                  <a:tcPr/>
-                </a:tc>
-                <a:extLst>
-                  <a:ext uri="{0D108BD9-81ED-4DB2-BD59-A6C34878D82A}">
-                    <a16:rowId xmlns:a16="http://schemas.microsoft.com/office/drawing/2014/main" val="856462223"/>
-                  </a:ext>
-                </a:extLst>
-              </a:tr>
-              <a:tr h="1144299">
-                <a:tc>
-                  <a:txBody>
-                    <a:bodyPr/>
-                    <a:lstStyle/>
-                    <a:p>
-                      <a:endParaRPr lang="fr-FR" dirty="0"/>
-                    </a:p>
-                  </a:txBody>
-                  <a:tcPr/>
-                </a:tc>
-                <a:extLst>
-                  <a:ext uri="{0D108BD9-81ED-4DB2-BD59-A6C34878D82A}">
-                    <a16:rowId xmlns:a16="http://schemas.microsoft.com/office/drawing/2014/main" val="3887155925"/>
-                  </a:ext>
-                </a:extLst>
-              </a:tr>
-              <a:tr h="1144299">
-                <a:tc>
-                  <a:txBody>
-                    <a:bodyPr/>
-                    <a:lstStyle/>
-                    <a:p>
-                      <a:endParaRPr lang="fr-FR" dirty="0"/>
-                    </a:p>
-                  </a:txBody>
-                  <a:tcPr/>
-                </a:tc>
-                <a:extLst>
-                  <a:ext uri="{0D108BD9-81ED-4DB2-BD59-A6C34878D82A}">
-                    <a16:rowId xmlns:a16="http://schemas.microsoft.com/office/drawing/2014/main" val="136556966"/>
-                  </a:ext>
-                </a:extLst>
-              </a:tr>
-            </a:tbl>
-          </a:graphicData>
-        </a:graphic>
-      </p:graphicFrame>
-      <p:grpSp>
-        <p:nvGrpSpPr>
-          <p:cNvPr id="95" name="Groupe 94">
-            <a:extLst>
-              <a:ext uri="{FF2B5EF4-FFF2-40B4-BE49-F238E27FC236}">
-                <a16:creationId xmlns:a16="http://schemas.microsoft.com/office/drawing/2014/main" id="{4DA24D0F-1406-4717-993E-CF048740FCAF}"/>
-              </a:ext>
-            </a:extLst>
-          </p:cNvPr>
-          <p:cNvGrpSpPr/>
-          <p:nvPr/>
-        </p:nvGrpSpPr>
-        <p:grpSpPr>
-          <a:xfrm>
-            <a:off x="235659" y="4904725"/>
-            <a:ext cx="5984850" cy="2133984"/>
-            <a:chOff x="323163" y="6681780"/>
-            <a:chExt cx="5984850" cy="2133984"/>
-          </a:xfrm>
-        </p:grpSpPr>
-        <p:grpSp>
-          <p:nvGrpSpPr>
-            <p:cNvPr id="94" name="Groupe 93">
-              <a:extLst>
-                <a:ext uri="{FF2B5EF4-FFF2-40B4-BE49-F238E27FC236}">
-                  <a16:creationId xmlns:a16="http://schemas.microsoft.com/office/drawing/2014/main" id="{18225230-BE6E-4816-8F78-FC6C225FFB6D}"/>
-                </a:ext>
-              </a:extLst>
-            </p:cNvPr>
-            <p:cNvGrpSpPr/>
-            <p:nvPr/>
-          </p:nvGrpSpPr>
-          <p:grpSpPr>
-            <a:xfrm>
-              <a:off x="323163" y="6681780"/>
-              <a:ext cx="5984850" cy="2133984"/>
-              <a:chOff x="323163" y="6681780"/>
-              <a:chExt cx="5984850" cy="2133984"/>
-            </a:xfrm>
-          </p:grpSpPr>
-          <p:sp>
-            <p:nvSpPr>
-              <p:cNvPr id="23" name="ZoneTexte 22">
-                <a:extLst>
-                  <a:ext uri="{FF2B5EF4-FFF2-40B4-BE49-F238E27FC236}">
-                    <a16:creationId xmlns:a16="http://schemas.microsoft.com/office/drawing/2014/main" id="{B3385C04-8F2C-42B3-B854-9AF13CD8059C}"/>
-                  </a:ext>
-                </a:extLst>
-              </p:cNvPr>
-              <p:cNvSpPr txBox="1"/>
-              <p:nvPr/>
-            </p:nvSpPr>
-            <p:spPr>
-              <a:xfrm>
-                <a:off x="619499" y="6681780"/>
-                <a:ext cx="5394951" cy="461665"/>
-              </a:xfrm>
-              <a:prstGeom prst="rect">
-                <a:avLst/>
-              </a:prstGeom>
-              <a:noFill/>
-            </p:spPr>
-            <p:txBody>
-              <a:bodyPr wrap="square" rtlCol="0">
-                <a:spAutoFit/>
-              </a:bodyPr>
-              <a:lstStyle/>
-              <a:p>
-                <a:pPr algn="ctr"/>
-                <a:r>
-                  <a:rPr lang="fr-FR" sz="2400" u="sng" dirty="0"/>
-                  <a:t>Gestion des utilisateurs - Droits</a:t>
-                </a:r>
-              </a:p>
-            </p:txBody>
-          </p:sp>
-          <p:grpSp>
-            <p:nvGrpSpPr>
-              <p:cNvPr id="93" name="Groupe 92">
-                <a:extLst>
-                  <a:ext uri="{FF2B5EF4-FFF2-40B4-BE49-F238E27FC236}">
-                    <a16:creationId xmlns:a16="http://schemas.microsoft.com/office/drawing/2014/main" id="{B2B82651-F9A4-4100-A2A8-45ADD8ACC82D}"/>
-                  </a:ext>
-                </a:extLst>
-              </p:cNvPr>
-              <p:cNvGrpSpPr/>
-              <p:nvPr/>
-            </p:nvGrpSpPr>
-            <p:grpSpPr>
-              <a:xfrm>
-                <a:off x="323163" y="7548357"/>
-                <a:ext cx="5984850" cy="1267407"/>
-                <a:chOff x="323163" y="7548357"/>
-                <a:chExt cx="5984850" cy="1267407"/>
-              </a:xfrm>
-            </p:grpSpPr>
-            <p:grpSp>
-              <p:nvGrpSpPr>
-                <p:cNvPr id="87" name="Groupe 86">
-                  <a:extLst>
-                    <a:ext uri="{FF2B5EF4-FFF2-40B4-BE49-F238E27FC236}">
-                      <a16:creationId xmlns:a16="http://schemas.microsoft.com/office/drawing/2014/main" id="{D99429FD-81C8-433B-A708-C59EFE81B27D}"/>
-                    </a:ext>
-                  </a:extLst>
-                </p:cNvPr>
-                <p:cNvGrpSpPr/>
-                <p:nvPr/>
-              </p:nvGrpSpPr>
-              <p:grpSpPr>
-                <a:xfrm>
-                  <a:off x="4753533" y="7548357"/>
-                  <a:ext cx="1554480" cy="1224420"/>
-                  <a:chOff x="4753533" y="7548357"/>
-                  <a:chExt cx="1554480" cy="1224420"/>
-                </a:xfrm>
-              </p:grpSpPr>
-              <p:sp>
-                <p:nvSpPr>
-                  <p:cNvPr id="24" name="Ellipse 23">
-                    <a:extLst>
-                      <a:ext uri="{FF2B5EF4-FFF2-40B4-BE49-F238E27FC236}">
-                        <a16:creationId xmlns:a16="http://schemas.microsoft.com/office/drawing/2014/main" id="{D633F458-3F49-4ADA-8FA5-B62131291CFB}"/>
-                      </a:ext>
-                    </a:extLst>
-                  </p:cNvPr>
-                  <p:cNvSpPr/>
-                  <p:nvPr/>
-                </p:nvSpPr>
-                <p:spPr>
-                  <a:xfrm>
-                    <a:off x="4753533" y="7548357"/>
-                    <a:ext cx="1554480" cy="1224420"/>
-                  </a:xfrm>
-                  <a:prstGeom prst="ellipse">
-                    <a:avLst/>
-                  </a:prstGeom>
-                </p:spPr>
-                <p:style>
-                  <a:lnRef idx="2">
-                    <a:schemeClr val="accent3">
-                      <a:shade val="50000"/>
-                    </a:schemeClr>
-                  </a:lnRef>
-                  <a:fillRef idx="1">
-                    <a:schemeClr val="accent3"/>
-                  </a:fillRef>
-                  <a:effectRef idx="0">
-                    <a:schemeClr val="accent3"/>
-                  </a:effectRef>
-                  <a:fontRef idx="minor">
-                    <a:schemeClr val="lt1"/>
-                  </a:fontRef>
-                </p:style>
-                <p:txBody>
-                  <a:bodyPr rtlCol="0" anchor="ctr"/>
-                  <a:lstStyle/>
-                  <a:p>
-                    <a:pPr algn="ctr"/>
-                    <a:endParaRPr lang="fr-FR"/>
-                  </a:p>
-                </p:txBody>
-              </p:sp>
-              <p:sp>
-                <p:nvSpPr>
-                  <p:cNvPr id="27" name="ZoneTexte 26">
-                    <a:extLst>
-                      <a:ext uri="{FF2B5EF4-FFF2-40B4-BE49-F238E27FC236}">
-                        <a16:creationId xmlns:a16="http://schemas.microsoft.com/office/drawing/2014/main" id="{38AF0EFB-4C5E-4E7E-8A90-0EFA26958A8C}"/>
-                      </a:ext>
-                    </a:extLst>
-                  </p:cNvPr>
-                  <p:cNvSpPr txBox="1"/>
-                  <p:nvPr/>
-                </p:nvSpPr>
-                <p:spPr>
-                  <a:xfrm>
-                    <a:off x="4753533" y="7879282"/>
-                    <a:ext cx="1554479" cy="523220"/>
-                  </a:xfrm>
-                  <a:prstGeom prst="rect">
-                    <a:avLst/>
-                  </a:prstGeom>
-                  <a:noFill/>
-                </p:spPr>
-                <p:txBody>
-                  <a:bodyPr wrap="square" rtlCol="0">
-                    <a:spAutoFit/>
-                  </a:bodyPr>
-                  <a:lstStyle/>
-                  <a:p>
-                    <a:pPr algn="ctr"/>
-                    <a:r>
-                      <a:rPr lang="fr-FR" sz="2800" dirty="0"/>
-                      <a:t>Admin</a:t>
-                    </a:r>
-                  </a:p>
-                </p:txBody>
-              </p:sp>
-            </p:grpSp>
-            <p:grpSp>
-              <p:nvGrpSpPr>
-                <p:cNvPr id="86" name="Groupe 85">
-                  <a:extLst>
-                    <a:ext uri="{FF2B5EF4-FFF2-40B4-BE49-F238E27FC236}">
-                      <a16:creationId xmlns:a16="http://schemas.microsoft.com/office/drawing/2014/main" id="{6EE306BA-8588-496C-BD16-D342082AD7F2}"/>
-                    </a:ext>
-                  </a:extLst>
-                </p:cNvPr>
-                <p:cNvGrpSpPr/>
-                <p:nvPr/>
-              </p:nvGrpSpPr>
-              <p:grpSpPr>
-                <a:xfrm>
-                  <a:off x="2539737" y="7591344"/>
-                  <a:ext cx="1555868" cy="1224420"/>
-                  <a:chOff x="2539737" y="7591344"/>
-                  <a:chExt cx="1555868" cy="1224420"/>
-                </a:xfrm>
-              </p:grpSpPr>
-              <p:sp>
-                <p:nvSpPr>
-                  <p:cNvPr id="25" name="Ellipse 24">
-                    <a:extLst>
-                      <a:ext uri="{FF2B5EF4-FFF2-40B4-BE49-F238E27FC236}">
-                        <a16:creationId xmlns:a16="http://schemas.microsoft.com/office/drawing/2014/main" id="{126354DF-C013-4AEA-B486-C8EFD9A637DB}"/>
-                      </a:ext>
-                    </a:extLst>
-                  </p:cNvPr>
-                  <p:cNvSpPr/>
-                  <p:nvPr/>
-                </p:nvSpPr>
-                <p:spPr>
-                  <a:xfrm>
-                    <a:off x="2541125" y="7591344"/>
-                    <a:ext cx="1554480" cy="1224420"/>
-                  </a:xfrm>
-                  <a:prstGeom prst="ellipse">
-                    <a:avLst/>
-                  </a:prstGeom>
-                </p:spPr>
-                <p:style>
-                  <a:lnRef idx="2">
-                    <a:schemeClr val="accent3">
-                      <a:shade val="50000"/>
-                    </a:schemeClr>
-                  </a:lnRef>
-                  <a:fillRef idx="1">
-                    <a:schemeClr val="accent3"/>
-                  </a:fillRef>
-                  <a:effectRef idx="0">
-                    <a:schemeClr val="accent3"/>
-                  </a:effectRef>
-                  <a:fontRef idx="minor">
-                    <a:schemeClr val="lt1"/>
-                  </a:fontRef>
-                </p:style>
-                <p:txBody>
-                  <a:bodyPr rtlCol="0" anchor="ctr"/>
-                  <a:lstStyle/>
-                  <a:p>
-                    <a:pPr algn="ctr"/>
-                    <a:endParaRPr lang="fr-FR"/>
-                  </a:p>
-                </p:txBody>
-              </p:sp>
-              <p:sp>
-                <p:nvSpPr>
-                  <p:cNvPr id="28" name="ZoneTexte 27">
-                    <a:extLst>
-                      <a:ext uri="{FF2B5EF4-FFF2-40B4-BE49-F238E27FC236}">
-                        <a16:creationId xmlns:a16="http://schemas.microsoft.com/office/drawing/2014/main" id="{C6A9D79A-95A0-49F9-BB7D-0E2397DD2E17}"/>
-                      </a:ext>
-                    </a:extLst>
-                  </p:cNvPr>
-                  <p:cNvSpPr txBox="1"/>
-                  <p:nvPr/>
-                </p:nvSpPr>
-                <p:spPr>
-                  <a:xfrm>
-                    <a:off x="2539737" y="7898957"/>
-                    <a:ext cx="1554479" cy="523220"/>
-                  </a:xfrm>
-                  <a:prstGeom prst="rect">
-                    <a:avLst/>
-                  </a:prstGeom>
-                  <a:noFill/>
-                </p:spPr>
-                <p:txBody>
-                  <a:bodyPr wrap="square" rtlCol="0">
-                    <a:spAutoFit/>
-                  </a:bodyPr>
-                  <a:lstStyle/>
-                  <a:p>
-                    <a:pPr algn="ctr"/>
-                    <a:r>
-                      <a:rPr lang="fr-FR" sz="2800" dirty="0"/>
-                      <a:t>Prof</a:t>
-                    </a:r>
-                  </a:p>
-                </p:txBody>
-              </p:sp>
-            </p:grpSp>
-            <p:grpSp>
-              <p:nvGrpSpPr>
-                <p:cNvPr id="88" name="Groupe 87">
-                  <a:extLst>
-                    <a:ext uri="{FF2B5EF4-FFF2-40B4-BE49-F238E27FC236}">
-                      <a16:creationId xmlns:a16="http://schemas.microsoft.com/office/drawing/2014/main" id="{0805335F-4258-4943-8F11-4FB26D64EDC1}"/>
-                    </a:ext>
-                  </a:extLst>
-                </p:cNvPr>
-                <p:cNvGrpSpPr/>
-                <p:nvPr/>
-              </p:nvGrpSpPr>
-              <p:grpSpPr>
-                <a:xfrm>
-                  <a:off x="323163" y="7587486"/>
-                  <a:ext cx="1557257" cy="1224420"/>
-                  <a:chOff x="323163" y="7587486"/>
-                  <a:chExt cx="1557257" cy="1224420"/>
-                </a:xfrm>
-              </p:grpSpPr>
-              <p:sp>
-                <p:nvSpPr>
-                  <p:cNvPr id="26" name="Ellipse 25">
-                    <a:extLst>
-                      <a:ext uri="{FF2B5EF4-FFF2-40B4-BE49-F238E27FC236}">
-                        <a16:creationId xmlns:a16="http://schemas.microsoft.com/office/drawing/2014/main" id="{83E33968-B1D4-487B-AD6E-D418683BC9F8}"/>
-                      </a:ext>
-                    </a:extLst>
-                  </p:cNvPr>
-                  <p:cNvSpPr/>
-                  <p:nvPr/>
-                </p:nvSpPr>
-                <p:spPr>
-                  <a:xfrm>
-                    <a:off x="325941" y="7587486"/>
-                    <a:ext cx="1554479" cy="1224420"/>
-                  </a:xfrm>
-                  <a:prstGeom prst="ellipse">
-                    <a:avLst/>
-                  </a:prstGeom>
-                </p:spPr>
-                <p:style>
-                  <a:lnRef idx="2">
-                    <a:schemeClr val="accent3">
-                      <a:shade val="50000"/>
-                    </a:schemeClr>
-                  </a:lnRef>
-                  <a:fillRef idx="1">
-                    <a:schemeClr val="accent3"/>
-                  </a:fillRef>
-                  <a:effectRef idx="0">
-                    <a:schemeClr val="accent3"/>
-                  </a:effectRef>
-                  <a:fontRef idx="minor">
-                    <a:schemeClr val="lt1"/>
-                  </a:fontRef>
-                </p:style>
-                <p:txBody>
-                  <a:bodyPr rtlCol="0" anchor="ctr"/>
-                  <a:lstStyle/>
-                  <a:p>
-                    <a:pPr algn="ctr"/>
-                    <a:endParaRPr lang="fr-FR"/>
-                  </a:p>
-                </p:txBody>
-              </p:sp>
-              <p:sp>
-                <p:nvSpPr>
-                  <p:cNvPr id="29" name="ZoneTexte 28">
-                    <a:extLst>
-                      <a:ext uri="{FF2B5EF4-FFF2-40B4-BE49-F238E27FC236}">
-                        <a16:creationId xmlns:a16="http://schemas.microsoft.com/office/drawing/2014/main" id="{10FB15FB-F988-4AB8-B9C1-8A2D332FC05A}"/>
-                      </a:ext>
-                    </a:extLst>
-                  </p:cNvPr>
-                  <p:cNvSpPr txBox="1"/>
-                  <p:nvPr/>
-                </p:nvSpPr>
-                <p:spPr>
-                  <a:xfrm>
-                    <a:off x="323163" y="7918411"/>
-                    <a:ext cx="1554479" cy="523220"/>
-                  </a:xfrm>
-                  <a:prstGeom prst="rect">
-                    <a:avLst/>
-                  </a:prstGeom>
-                  <a:noFill/>
-                </p:spPr>
-                <p:txBody>
-                  <a:bodyPr wrap="square" rtlCol="0">
-                    <a:spAutoFit/>
-                  </a:bodyPr>
-                  <a:lstStyle/>
-                  <a:p>
-                    <a:pPr algn="ctr"/>
-                    <a:r>
-                      <a:rPr lang="fr-FR" sz="2800" dirty="0"/>
-                      <a:t>Etudiant</a:t>
-                    </a:r>
-                  </a:p>
-                </p:txBody>
-              </p:sp>
-            </p:grpSp>
-          </p:grpSp>
-        </p:grpSp>
-        <p:cxnSp>
-          <p:nvCxnSpPr>
-            <p:cNvPr id="32" name="Connecteur : en arc 31">
-              <a:extLst>
-                <a:ext uri="{FF2B5EF4-FFF2-40B4-BE49-F238E27FC236}">
-                  <a16:creationId xmlns:a16="http://schemas.microsoft.com/office/drawing/2014/main" id="{DD297679-9E54-4287-8C90-E162B622B7E4}"/>
-                </a:ext>
-              </a:extLst>
-            </p:cNvPr>
-            <p:cNvCxnSpPr>
-              <a:cxnSpLocks/>
-              <a:stCxn id="26" idx="0"/>
-              <a:endCxn id="28" idx="1"/>
-            </p:cNvCxnSpPr>
-            <p:nvPr/>
-          </p:nvCxnSpPr>
-          <p:spPr>
-            <a:xfrm rot="16200000" flipH="1">
-              <a:off x="1534918" y="7155748"/>
-              <a:ext cx="573081" cy="1436556"/>
-            </a:xfrm>
-            <a:prstGeom prst="curvedConnector4">
-              <a:avLst>
-                <a:gd name="adj1" fmla="val -39890"/>
-                <a:gd name="adj2" fmla="val 77052"/>
-              </a:avLst>
-            </a:prstGeom>
-            <a:ln>
-              <a:tailEnd type="triangle"/>
-            </a:ln>
-          </p:spPr>
-          <p:style>
-            <a:lnRef idx="1">
-              <a:schemeClr val="dk1"/>
-            </a:lnRef>
-            <a:fillRef idx="0">
-              <a:schemeClr val="dk1"/>
-            </a:fillRef>
-            <a:effectRef idx="0">
-              <a:schemeClr val="dk1"/>
-            </a:effectRef>
-            <a:fontRef idx="minor">
-              <a:schemeClr val="tx1"/>
-            </a:fontRef>
-          </p:style>
-        </p:cxnSp>
-        <p:cxnSp>
-          <p:nvCxnSpPr>
-            <p:cNvPr id="33" name="Connecteur : en arc 32">
-              <a:extLst>
-                <a:ext uri="{FF2B5EF4-FFF2-40B4-BE49-F238E27FC236}">
-                  <a16:creationId xmlns:a16="http://schemas.microsoft.com/office/drawing/2014/main" id="{3F09D49B-7D05-43BB-A003-73712535CF2B}"/>
-                </a:ext>
-              </a:extLst>
-            </p:cNvPr>
-            <p:cNvCxnSpPr>
-              <a:cxnSpLocks/>
-              <a:stCxn id="25" idx="0"/>
-              <a:endCxn id="27" idx="1"/>
-            </p:cNvCxnSpPr>
-            <p:nvPr/>
-          </p:nvCxnSpPr>
-          <p:spPr>
-            <a:xfrm rot="16200000" flipH="1">
-              <a:off x="3761175" y="7148534"/>
-              <a:ext cx="549548" cy="1435168"/>
-            </a:xfrm>
-            <a:prstGeom prst="curvedConnector4">
-              <a:avLst>
-                <a:gd name="adj1" fmla="val -41598"/>
-                <a:gd name="adj2" fmla="val 77078"/>
-              </a:avLst>
-            </a:prstGeom>
-            <a:ln>
-              <a:tailEnd type="triangle"/>
-            </a:ln>
-          </p:spPr>
-          <p:style>
-            <a:lnRef idx="1">
-              <a:schemeClr val="dk1"/>
-            </a:lnRef>
-            <a:fillRef idx="0">
-              <a:schemeClr val="dk1"/>
-            </a:fillRef>
-            <a:effectRef idx="0">
-              <a:schemeClr val="dk1"/>
-            </a:effectRef>
-            <a:fontRef idx="minor">
-              <a:schemeClr val="tx1"/>
-            </a:fontRef>
-          </p:style>
-        </p:cxnSp>
-      </p:grpSp>
-      <p:graphicFrame>
-        <p:nvGraphicFramePr>
-          <p:cNvPr id="36" name="Tableau 35">
-            <a:extLst>
-              <a:ext uri="{FF2B5EF4-FFF2-40B4-BE49-F238E27FC236}">
-                <a16:creationId xmlns:a16="http://schemas.microsoft.com/office/drawing/2014/main" id="{CC8ECFEE-0569-4545-8BAE-E96BC7574027}"/>
-              </a:ext>
-            </a:extLst>
-          </p:cNvPr>
-          <p:cNvGraphicFramePr>
-            <a:graphicFrameLocks noGrp="1"/>
-          </p:cNvGraphicFramePr>
-          <p:nvPr>
-            <p:extLst>
-              <p:ext uri="{D42A27DB-BD31-4B8C-83A1-F6EECF244321}">
-                <p14:modId xmlns:p14="http://schemas.microsoft.com/office/powerpoint/2010/main" val="1893976525"/>
-              </p:ext>
-            </p:extLst>
-          </p:nvPr>
-        </p:nvGraphicFramePr>
-        <p:xfrm>
-          <a:off x="2542302" y="7058906"/>
-          <a:ext cx="1520120" cy="3432897"/>
-        </p:xfrm>
-        <a:graphic>
-          <a:graphicData uri="http://schemas.openxmlformats.org/drawingml/2006/table">
-            <a:tbl>
-              <a:tblPr firstRow="1" bandRow="1">
-                <a:tableStyleId>{5940675A-B579-460E-94D1-54222C63F5DA}</a:tableStyleId>
-              </a:tblPr>
-              <a:tblGrid>
-                <a:gridCol w="1520120">
-                  <a:extLst>
-                    <a:ext uri="{9D8B030D-6E8A-4147-A177-3AD203B41FA5}">
-                      <a16:colId xmlns:a16="http://schemas.microsoft.com/office/drawing/2014/main" val="4082210562"/>
-                    </a:ext>
-                  </a:extLst>
-                </a:gridCol>
-              </a:tblGrid>
-              <a:tr h="1144299">
-                <a:tc>
-                  <a:txBody>
-                    <a:bodyPr/>
-                    <a:lstStyle/>
-                    <a:p>
-                      <a:endParaRPr lang="fr-FR" dirty="0"/>
-                    </a:p>
-                  </a:txBody>
-                  <a:tcPr/>
-                </a:tc>
-                <a:extLst>
-                  <a:ext uri="{0D108BD9-81ED-4DB2-BD59-A6C34878D82A}">
-                    <a16:rowId xmlns:a16="http://schemas.microsoft.com/office/drawing/2014/main" val="856462223"/>
-                  </a:ext>
-                </a:extLst>
-              </a:tr>
-              <a:tr h="1144299">
-                <a:tc>
-                  <a:txBody>
-                    <a:bodyPr/>
-                    <a:lstStyle/>
-                    <a:p>
-                      <a:endParaRPr lang="fr-FR" dirty="0"/>
-                    </a:p>
-                  </a:txBody>
-                  <a:tcPr/>
-                </a:tc>
-                <a:extLst>
-                  <a:ext uri="{0D108BD9-81ED-4DB2-BD59-A6C34878D82A}">
-                    <a16:rowId xmlns:a16="http://schemas.microsoft.com/office/drawing/2014/main" val="3887155925"/>
-                  </a:ext>
-                </a:extLst>
-              </a:tr>
-              <a:tr h="1144299">
-                <a:tc>
-                  <a:txBody>
-                    <a:bodyPr/>
-                    <a:lstStyle/>
-                    <a:p>
-                      <a:endParaRPr lang="fr-FR" dirty="0"/>
-                    </a:p>
-                  </a:txBody>
-                  <a:tcPr/>
-                </a:tc>
-                <a:extLst>
-                  <a:ext uri="{0D108BD9-81ED-4DB2-BD59-A6C34878D82A}">
-                    <a16:rowId xmlns:a16="http://schemas.microsoft.com/office/drawing/2014/main" val="136556966"/>
-                  </a:ext>
-                </a:extLst>
-              </a:tr>
-            </a:tbl>
-          </a:graphicData>
-        </a:graphic>
-      </p:graphicFrame>
-      <p:graphicFrame>
-        <p:nvGraphicFramePr>
-          <p:cNvPr id="38" name="Tableau 37">
-            <a:extLst>
-              <a:ext uri="{FF2B5EF4-FFF2-40B4-BE49-F238E27FC236}">
-                <a16:creationId xmlns:a16="http://schemas.microsoft.com/office/drawing/2014/main" id="{2D503EAD-FA75-4A97-9815-06A04991E96A}"/>
-              </a:ext>
-            </a:extLst>
-          </p:cNvPr>
-          <p:cNvGraphicFramePr>
-            <a:graphicFrameLocks noGrp="1"/>
-          </p:cNvGraphicFramePr>
-          <p:nvPr>
-            <p:extLst>
-              <p:ext uri="{D42A27DB-BD31-4B8C-83A1-F6EECF244321}">
-                <p14:modId xmlns:p14="http://schemas.microsoft.com/office/powerpoint/2010/main" val="2505192744"/>
-              </p:ext>
-            </p:extLst>
-          </p:nvPr>
-        </p:nvGraphicFramePr>
-        <p:xfrm>
-          <a:off x="4796692" y="7053828"/>
-          <a:ext cx="1438934" cy="1117083"/>
-        </p:xfrm>
-        <a:graphic>
-          <a:graphicData uri="http://schemas.openxmlformats.org/drawingml/2006/table">
-            <a:tbl>
-              <a:tblPr firstRow="1" bandRow="1">
-                <a:tableStyleId>{5940675A-B579-460E-94D1-54222C63F5DA}</a:tableStyleId>
-              </a:tblPr>
-              <a:tblGrid>
-                <a:gridCol w="1438934">
-                  <a:extLst>
-                    <a:ext uri="{9D8B030D-6E8A-4147-A177-3AD203B41FA5}">
-                      <a16:colId xmlns:a16="http://schemas.microsoft.com/office/drawing/2014/main" val="3579164638"/>
-                    </a:ext>
-                  </a:extLst>
-                </a:gridCol>
-              </a:tblGrid>
-              <a:tr h="1117083">
-                <a:tc>
-                  <a:txBody>
-                    <a:bodyPr/>
-                    <a:lstStyle/>
-                    <a:p>
-                      <a:endParaRPr lang="fr-FR" dirty="0"/>
-                    </a:p>
-                  </a:txBody>
-                  <a:tcPr/>
-                </a:tc>
-                <a:extLst>
-                  <a:ext uri="{0D108BD9-81ED-4DB2-BD59-A6C34878D82A}">
-                    <a16:rowId xmlns:a16="http://schemas.microsoft.com/office/drawing/2014/main" val="3295655757"/>
-                  </a:ext>
-                </a:extLst>
-              </a:tr>
-            </a:tbl>
-          </a:graphicData>
-        </a:graphic>
-      </p:graphicFrame>
-      <p:grpSp>
-        <p:nvGrpSpPr>
-          <p:cNvPr id="85" name="Groupe 84">
-            <a:extLst>
-              <a:ext uri="{FF2B5EF4-FFF2-40B4-BE49-F238E27FC236}">
-                <a16:creationId xmlns:a16="http://schemas.microsoft.com/office/drawing/2014/main" id="{10680867-FB8B-47F3-BA70-4AD7406813F9}"/>
-              </a:ext>
-            </a:extLst>
-          </p:cNvPr>
-          <p:cNvGrpSpPr/>
-          <p:nvPr/>
-        </p:nvGrpSpPr>
-        <p:grpSpPr>
-          <a:xfrm>
-            <a:off x="5664337" y="1493134"/>
-            <a:ext cx="4715570" cy="3244796"/>
-            <a:chOff x="578885" y="1594338"/>
-            <a:chExt cx="4715570" cy="3244796"/>
-          </a:xfrm>
-        </p:grpSpPr>
-        <p:sp>
-          <p:nvSpPr>
-            <p:cNvPr id="53" name="Rectangle : coins arrondis 52">
-              <a:extLst>
-                <a:ext uri="{FF2B5EF4-FFF2-40B4-BE49-F238E27FC236}">
-                  <a16:creationId xmlns:a16="http://schemas.microsoft.com/office/drawing/2014/main" id="{51A2E07E-8317-486D-A510-F0D3B1D8A7A9}"/>
-                </a:ext>
-              </a:extLst>
-            </p:cNvPr>
-            <p:cNvSpPr/>
-            <p:nvPr/>
-          </p:nvSpPr>
-          <p:spPr>
-            <a:xfrm>
-              <a:off x="703385" y="1594348"/>
-              <a:ext cx="4591070" cy="3244786"/>
-            </a:xfrm>
-            <a:prstGeom prst="roundRect">
-              <a:avLst/>
-            </a:prstGeom>
-            <a:solidFill>
-              <a:schemeClr val="bg1"/>
-            </a:solidFill>
-            <a:ln>
-              <a:solidFill>
-                <a:schemeClr val="bg1">
-                  <a:lumMod val="50000"/>
-                </a:schemeClr>
-              </a:solidFill>
-            </a:ln>
-          </p:spPr>
-          <p:style>
-            <a:lnRef idx="2">
-              <a:schemeClr val="accent1">
-                <a:shade val="50000"/>
-              </a:schemeClr>
-            </a:lnRef>
-            <a:fillRef idx="1">
-              <a:schemeClr val="accent1"/>
-            </a:fillRef>
-            <a:effectRef idx="0">
-              <a:schemeClr val="accent1"/>
-            </a:effectRef>
-            <a:fontRef idx="minor">
-              <a:schemeClr val="lt1"/>
-            </a:fontRef>
-          </p:style>
-          <p:txBody>
-            <a:bodyPr rtlCol="0" anchor="ctr"/>
-            <a:lstStyle/>
-            <a:p>
-              <a:pPr algn="ctr"/>
-              <a:endParaRPr lang="fr-FR" dirty="0">
-                <a:highlight>
-                  <a:srgbClr val="000000"/>
-                </a:highlight>
-              </a:endParaRPr>
-            </a:p>
-          </p:txBody>
-        </p:sp>
-        <p:pic>
-          <p:nvPicPr>
-            <p:cNvPr id="49" name="Image 48" descr="RÃ©sultat de recherche d'images pour &quot;php&quot;">
-              <a:extLst>
-                <a:ext uri="{FF2B5EF4-FFF2-40B4-BE49-F238E27FC236}">
-                  <a16:creationId xmlns:a16="http://schemas.microsoft.com/office/drawing/2014/main" id="{E9AD95B9-D9FB-46EF-95C8-FA21F3168041}"/>
-                </a:ext>
-              </a:extLst>
-            </p:cNvPr>
-            <p:cNvPicPr/>
-            <p:nvPr/>
-          </p:nvPicPr>
-          <p:blipFill>
-            <a:blip r:embed="rId3" cstate="print">
-              <a:extLst>
-                <a:ext uri="{28A0092B-C50C-407E-A947-70E740481C1C}">
-                  <a14:useLocalDpi xmlns:a14="http://schemas.microsoft.com/office/drawing/2010/main" val="0"/>
-                </a:ext>
-              </a:extLst>
-            </a:blip>
-            <a:srcRect/>
-            <a:stretch>
-              <a:fillRect/>
-            </a:stretch>
-          </p:blipFill>
-          <p:spPr bwMode="auto">
-            <a:xfrm>
-              <a:off x="596749" y="2309039"/>
-              <a:ext cx="2165350" cy="1082040"/>
-            </a:xfrm>
-            <a:prstGeom prst="rect">
-              <a:avLst/>
-            </a:prstGeom>
-            <a:noFill/>
-            <a:ln>
-              <a:noFill/>
-            </a:ln>
-          </p:spPr>
-        </p:pic>
-        <p:pic>
-          <p:nvPicPr>
-            <p:cNvPr id="50" name="Image 49" descr="RÃ©sultat de recherche d'images pour &quot;symfony&quot;">
-              <a:extLst>
-                <a:ext uri="{FF2B5EF4-FFF2-40B4-BE49-F238E27FC236}">
-                  <a16:creationId xmlns:a16="http://schemas.microsoft.com/office/drawing/2014/main" id="{C6766A19-9DB5-4449-AC3D-9798E2FA82CA}"/>
-                </a:ext>
-              </a:extLst>
-            </p:cNvPr>
-            <p:cNvPicPr/>
-            <p:nvPr/>
-          </p:nvPicPr>
-          <p:blipFill>
-            <a:blip r:embed="rId4" cstate="print">
-              <a:extLst>
-                <a:ext uri="{28A0092B-C50C-407E-A947-70E740481C1C}">
-                  <a14:useLocalDpi xmlns:a14="http://schemas.microsoft.com/office/drawing/2010/main" val="0"/>
-                </a:ext>
-              </a:extLst>
-            </a:blip>
-            <a:srcRect/>
-            <a:stretch>
-              <a:fillRect/>
-            </a:stretch>
-          </p:blipFill>
-          <p:spPr bwMode="auto">
-            <a:xfrm>
-              <a:off x="578885" y="3481546"/>
-              <a:ext cx="2169160" cy="1156970"/>
-            </a:xfrm>
-            <a:prstGeom prst="rect">
-              <a:avLst/>
-            </a:prstGeom>
-            <a:noFill/>
-            <a:ln>
-              <a:noFill/>
-            </a:ln>
-          </p:spPr>
-        </p:pic>
-        <p:pic>
-          <p:nvPicPr>
-            <p:cNvPr id="51" name="Image 50" descr="RÃ©sultat de recherche d'images pour &quot;html 5 css js&quot;">
-              <a:extLst>
-                <a:ext uri="{FF2B5EF4-FFF2-40B4-BE49-F238E27FC236}">
-                  <a16:creationId xmlns:a16="http://schemas.microsoft.com/office/drawing/2014/main" id="{80E14B05-F769-4EC7-8CF0-9FED8B746907}"/>
-                </a:ext>
-              </a:extLst>
-            </p:cNvPr>
-            <p:cNvPicPr/>
-            <p:nvPr/>
-          </p:nvPicPr>
-          <p:blipFill>
-            <a:blip r:embed="rId5" cstate="print">
-              <a:extLst>
-                <a:ext uri="{28A0092B-C50C-407E-A947-70E740481C1C}">
-                  <a14:useLocalDpi xmlns:a14="http://schemas.microsoft.com/office/drawing/2010/main" val="0"/>
-                </a:ext>
-              </a:extLst>
-            </a:blip>
-            <a:srcRect/>
-            <a:stretch>
-              <a:fillRect/>
-            </a:stretch>
-          </p:blipFill>
-          <p:spPr bwMode="auto">
-            <a:xfrm>
-              <a:off x="2722717" y="2226223"/>
-              <a:ext cx="2327910" cy="1309370"/>
-            </a:xfrm>
-            <a:prstGeom prst="rect">
-              <a:avLst/>
-            </a:prstGeom>
-            <a:noFill/>
-            <a:ln>
-              <a:noFill/>
-            </a:ln>
-          </p:spPr>
-        </p:pic>
-        <p:pic>
-          <p:nvPicPr>
-            <p:cNvPr id="52" name="Image 51" descr="RÃ©sultat de recherche d'images pour &quot;bootstrap&quot;">
-              <a:extLst>
-                <a:ext uri="{FF2B5EF4-FFF2-40B4-BE49-F238E27FC236}">
-                  <a16:creationId xmlns:a16="http://schemas.microsoft.com/office/drawing/2014/main" id="{7DE92D9C-5A80-46A6-BF83-202B6BDB8A6A}"/>
-                </a:ext>
-              </a:extLst>
-            </p:cNvPr>
-            <p:cNvPicPr/>
-            <p:nvPr/>
-          </p:nvPicPr>
-          <p:blipFill>
-            <a:blip r:embed="rId6" cstate="print">
-              <a:extLst>
-                <a:ext uri="{28A0092B-C50C-407E-A947-70E740481C1C}">
-                  <a14:useLocalDpi xmlns:a14="http://schemas.microsoft.com/office/drawing/2010/main" val="0"/>
-                </a:ext>
-              </a:extLst>
-            </a:blip>
-            <a:srcRect/>
-            <a:stretch>
-              <a:fillRect/>
-            </a:stretch>
-          </p:blipFill>
-          <p:spPr bwMode="auto">
-            <a:xfrm>
-              <a:off x="3004975" y="3794554"/>
-              <a:ext cx="1763395" cy="783590"/>
-            </a:xfrm>
-            <a:prstGeom prst="rect">
-              <a:avLst/>
-            </a:prstGeom>
-            <a:noFill/>
-            <a:ln>
-              <a:noFill/>
-            </a:ln>
-          </p:spPr>
-        </p:pic>
-        <p:sp>
-          <p:nvSpPr>
-            <p:cNvPr id="54" name="ZoneTexte 53">
-              <a:extLst>
-                <a:ext uri="{FF2B5EF4-FFF2-40B4-BE49-F238E27FC236}">
-                  <a16:creationId xmlns:a16="http://schemas.microsoft.com/office/drawing/2014/main" id="{038AC455-B2E5-40E3-8405-CECEDB92597B}"/>
-                </a:ext>
-              </a:extLst>
-            </p:cNvPr>
-            <p:cNvSpPr txBox="1"/>
-            <p:nvPr/>
-          </p:nvSpPr>
-          <p:spPr>
-            <a:xfrm>
-              <a:off x="855705" y="1594338"/>
-              <a:ext cx="4286429" cy="461665"/>
-            </a:xfrm>
-            <a:prstGeom prst="rect">
-              <a:avLst/>
-            </a:prstGeom>
-            <a:noFill/>
-          </p:spPr>
-          <p:txBody>
-            <a:bodyPr wrap="square" rtlCol="0">
-              <a:spAutoFit/>
-            </a:bodyPr>
-            <a:lstStyle/>
-            <a:p>
-              <a:pPr algn="ctr"/>
-              <a:r>
-                <a:rPr lang="fr-FR" sz="2400" b="1" u="sng" dirty="0"/>
-                <a:t>Technologies utilisées</a:t>
-              </a:r>
-            </a:p>
-          </p:txBody>
-        </p:sp>
-      </p:grpSp>
-      <p:grpSp>
-        <p:nvGrpSpPr>
-          <p:cNvPr id="92" name="Groupe 91">
-            <a:extLst>
-              <a:ext uri="{FF2B5EF4-FFF2-40B4-BE49-F238E27FC236}">
-                <a16:creationId xmlns:a16="http://schemas.microsoft.com/office/drawing/2014/main" id="{069730A8-025E-4CA1-88FB-BBB907538872}"/>
-              </a:ext>
-            </a:extLst>
-          </p:cNvPr>
-          <p:cNvGrpSpPr/>
-          <p:nvPr/>
-        </p:nvGrpSpPr>
-        <p:grpSpPr>
-          <a:xfrm>
-            <a:off x="308549" y="11399077"/>
-            <a:ext cx="10071357" cy="3244786"/>
-            <a:chOff x="5707122" y="11692720"/>
-            <a:chExt cx="10071357" cy="3244786"/>
-          </a:xfrm>
-        </p:grpSpPr>
-        <p:sp>
-          <p:nvSpPr>
-            <p:cNvPr id="56" name="Rectangle : coins arrondis 55">
-              <a:extLst>
-                <a:ext uri="{FF2B5EF4-FFF2-40B4-BE49-F238E27FC236}">
-                  <a16:creationId xmlns:a16="http://schemas.microsoft.com/office/drawing/2014/main" id="{F628AAC4-F9DA-4397-B079-95869252F3C6}"/>
-                </a:ext>
-              </a:extLst>
-            </p:cNvPr>
-            <p:cNvSpPr/>
-            <p:nvPr/>
-          </p:nvSpPr>
-          <p:spPr>
-            <a:xfrm>
-              <a:off x="5707122" y="11692720"/>
-              <a:ext cx="10071357" cy="3244786"/>
-            </a:xfrm>
-            <a:prstGeom prst="roundRect">
-              <a:avLst/>
-            </a:prstGeom>
-            <a:solidFill>
-              <a:schemeClr val="bg1"/>
-            </a:solidFill>
-            <a:ln>
-              <a:solidFill>
-                <a:schemeClr val="bg1">
-                  <a:lumMod val="50000"/>
-                </a:schemeClr>
-              </a:solidFill>
-            </a:ln>
-          </p:spPr>
-          <p:style>
-            <a:lnRef idx="2">
-              <a:schemeClr val="accent1">
-                <a:shade val="50000"/>
-              </a:schemeClr>
-            </a:lnRef>
-            <a:fillRef idx="1">
-              <a:schemeClr val="accent1"/>
-            </a:fillRef>
-            <a:effectRef idx="0">
-              <a:schemeClr val="accent1"/>
-            </a:effectRef>
-            <a:fontRef idx="minor">
-              <a:schemeClr val="lt1"/>
-            </a:fontRef>
-          </p:style>
-          <p:txBody>
-            <a:bodyPr rtlCol="0" anchor="ctr"/>
-            <a:lstStyle/>
-            <a:p>
-              <a:pPr algn="ctr"/>
-              <a:endParaRPr lang="fr-FR" dirty="0">
-                <a:highlight>
-                  <a:srgbClr val="000000"/>
-                </a:highlight>
-              </a:endParaRPr>
-            </a:p>
-          </p:txBody>
-        </p:sp>
-        <p:sp>
-          <p:nvSpPr>
-            <p:cNvPr id="55" name="ZoneTexte 54">
-              <a:extLst>
-                <a:ext uri="{FF2B5EF4-FFF2-40B4-BE49-F238E27FC236}">
-                  <a16:creationId xmlns:a16="http://schemas.microsoft.com/office/drawing/2014/main" id="{D986D322-6FFE-4CEA-94A7-C5BAB6CC0E01}"/>
-                </a:ext>
-              </a:extLst>
-            </p:cNvPr>
-            <p:cNvSpPr txBox="1"/>
-            <p:nvPr/>
-          </p:nvSpPr>
-          <p:spPr>
-            <a:xfrm>
-              <a:off x="9570942" y="11734600"/>
-              <a:ext cx="2541798" cy="461665"/>
-            </a:xfrm>
-            <a:prstGeom prst="rect">
-              <a:avLst/>
-            </a:prstGeom>
-            <a:noFill/>
-          </p:spPr>
-          <p:txBody>
-            <a:bodyPr wrap="square" rtlCol="0">
-              <a:spAutoFit/>
-            </a:bodyPr>
-            <a:lstStyle/>
-            <a:p>
-              <a:pPr algn="ctr"/>
-              <a:r>
-                <a:rPr lang="fr-FR" sz="2400" b="1" dirty="0"/>
-                <a:t>BDD</a:t>
-              </a:r>
-            </a:p>
-          </p:txBody>
-        </p:sp>
-        <p:pic>
-          <p:nvPicPr>
-            <p:cNvPr id="59" name="Image 58">
-              <a:extLst>
-                <a:ext uri="{FF2B5EF4-FFF2-40B4-BE49-F238E27FC236}">
-                  <a16:creationId xmlns:a16="http://schemas.microsoft.com/office/drawing/2014/main" id="{414F5D9E-5BFC-469D-9913-0E82EB068CFE}"/>
-                </a:ext>
-              </a:extLst>
-            </p:cNvPr>
-            <p:cNvPicPr/>
-            <p:nvPr/>
-          </p:nvPicPr>
-          <p:blipFill rotWithShape="1">
-            <a:blip r:embed="rId7">
-              <a:extLst>
-                <a:ext uri="{28A0092B-C50C-407E-A947-70E740481C1C}">
-                  <a14:useLocalDpi xmlns:a14="http://schemas.microsoft.com/office/drawing/2010/main" val="0"/>
-                </a:ext>
-              </a:extLst>
-            </a:blip>
-            <a:srcRect l="4428" r="4667"/>
-            <a:stretch/>
-          </p:blipFill>
-          <p:spPr>
-            <a:xfrm>
-              <a:off x="5856848" y="13007350"/>
-              <a:ext cx="4377799" cy="1662084"/>
-            </a:xfrm>
-            <a:prstGeom prst="rect">
-              <a:avLst/>
-            </a:prstGeom>
-          </p:spPr>
-        </p:pic>
-      </p:grpSp>
-      <p:grpSp>
-        <p:nvGrpSpPr>
-          <p:cNvPr id="84" name="Groupe 83">
-            <a:extLst>
-              <a:ext uri="{FF2B5EF4-FFF2-40B4-BE49-F238E27FC236}">
-                <a16:creationId xmlns:a16="http://schemas.microsoft.com/office/drawing/2014/main" id="{41B890EF-91C4-4C4B-92BA-FEBDBD65C504}"/>
-              </a:ext>
-            </a:extLst>
-          </p:cNvPr>
-          <p:cNvGrpSpPr/>
-          <p:nvPr/>
-        </p:nvGrpSpPr>
-        <p:grpSpPr>
-          <a:xfrm>
-            <a:off x="348297" y="1646591"/>
-            <a:ext cx="4954668" cy="2890721"/>
-            <a:chOff x="4470751" y="11775711"/>
-            <a:chExt cx="4954668" cy="2890721"/>
-          </a:xfrm>
-          <a:solidFill>
-            <a:schemeClr val="bg2">
-              <a:lumMod val="75000"/>
-            </a:schemeClr>
-          </a:solidFill>
-        </p:grpSpPr>
-        <p:sp>
-          <p:nvSpPr>
-            <p:cNvPr id="41" name="Rectangle 40">
-              <a:extLst>
-                <a:ext uri="{FF2B5EF4-FFF2-40B4-BE49-F238E27FC236}">
-                  <a16:creationId xmlns:a16="http://schemas.microsoft.com/office/drawing/2014/main" id="{3994C9EA-41AB-4565-989C-20E6C6CECD69}"/>
-                </a:ext>
-              </a:extLst>
-            </p:cNvPr>
-            <p:cNvSpPr/>
-            <p:nvPr/>
-          </p:nvSpPr>
-          <p:spPr>
-            <a:xfrm>
-              <a:off x="4470751" y="11775711"/>
-              <a:ext cx="4954668" cy="2890721"/>
-            </a:xfrm>
-            <a:prstGeom prst="rect">
-              <a:avLst/>
-            </a:prstGeom>
-            <a:grpFill/>
-          </p:spPr>
-          <p:style>
-            <a:lnRef idx="2">
-              <a:schemeClr val="dk1"/>
-            </a:lnRef>
-            <a:fillRef idx="1">
-              <a:schemeClr val="lt1"/>
-            </a:fillRef>
-            <a:effectRef idx="0">
-              <a:schemeClr val="dk1"/>
-            </a:effectRef>
-            <a:fontRef idx="minor">
-              <a:schemeClr val="dk1"/>
-            </a:fontRef>
-          </p:style>
-          <p:txBody>
-            <a:bodyPr rtlCol="0" anchor="ctr"/>
-            <a:lstStyle/>
-            <a:p>
-              <a:pPr algn="ctr"/>
-              <a:endParaRPr lang="fr-FR"/>
-            </a:p>
-          </p:txBody>
-        </p:sp>
-        <p:sp>
-          <p:nvSpPr>
-            <p:cNvPr id="45" name="ZoneTexte 44">
-              <a:extLst>
-                <a:ext uri="{FF2B5EF4-FFF2-40B4-BE49-F238E27FC236}">
-                  <a16:creationId xmlns:a16="http://schemas.microsoft.com/office/drawing/2014/main" id="{673826EF-96F0-4FB1-8FEC-BDF66547AE31}"/>
-                </a:ext>
-              </a:extLst>
-            </p:cNvPr>
-            <p:cNvSpPr txBox="1"/>
-            <p:nvPr/>
-          </p:nvSpPr>
-          <p:spPr>
-            <a:xfrm>
-              <a:off x="4833901" y="11853199"/>
-              <a:ext cx="4279140" cy="461665"/>
-            </a:xfrm>
-            <a:prstGeom prst="rect">
-              <a:avLst/>
-            </a:prstGeom>
-            <a:grpFill/>
-          </p:spPr>
-          <p:txBody>
-            <a:bodyPr wrap="square" rtlCol="0">
-              <a:spAutoFit/>
-            </a:bodyPr>
-            <a:lstStyle/>
-            <a:p>
-              <a:pPr algn="ctr"/>
-              <a:r>
-                <a:rPr lang="fr-FR" sz="2400" u="sng" dirty="0"/>
-                <a:t>Imprimerie – Pôle </a:t>
-              </a:r>
-              <a:r>
-                <a:rPr lang="fr-FR" sz="2400" u="sng" dirty="0" err="1"/>
-                <a:t>Plurimédia</a:t>
-              </a:r>
-              <a:endParaRPr lang="fr-FR" sz="2400" u="sng" dirty="0"/>
-            </a:p>
-          </p:txBody>
-        </p:sp>
-        <p:grpSp>
-          <p:nvGrpSpPr>
-            <p:cNvPr id="82" name="Groupe 81">
-              <a:extLst>
-                <a:ext uri="{FF2B5EF4-FFF2-40B4-BE49-F238E27FC236}">
-                  <a16:creationId xmlns:a16="http://schemas.microsoft.com/office/drawing/2014/main" id="{CA813880-C569-42CF-B957-0FAF6E38970D}"/>
-                </a:ext>
-              </a:extLst>
-            </p:cNvPr>
-            <p:cNvGrpSpPr/>
-            <p:nvPr/>
-          </p:nvGrpSpPr>
-          <p:grpSpPr>
-            <a:xfrm>
-              <a:off x="7686010" y="12387084"/>
-              <a:ext cx="1580528" cy="994814"/>
-              <a:chOff x="7453621" y="12463587"/>
-              <a:chExt cx="1580528" cy="994814"/>
-            </a:xfrm>
-            <a:grpFill/>
-          </p:grpSpPr>
-          <p:sp>
-            <p:nvSpPr>
-              <p:cNvPr id="78" name="Rectangle : coins arrondis 77">
-                <a:extLst>
-                  <a:ext uri="{FF2B5EF4-FFF2-40B4-BE49-F238E27FC236}">
-                    <a16:creationId xmlns:a16="http://schemas.microsoft.com/office/drawing/2014/main" id="{8DADBAD4-53DB-4D9D-AAFF-12F17639BD48}"/>
-                  </a:ext>
-                </a:extLst>
-              </p:cNvPr>
-              <p:cNvSpPr/>
-              <p:nvPr/>
-            </p:nvSpPr>
-            <p:spPr>
-              <a:xfrm>
-                <a:off x="7453621" y="12463587"/>
-                <a:ext cx="1580528" cy="994814"/>
-              </a:xfrm>
-              <a:prstGeom prst="roundRect">
-                <a:avLst/>
-              </a:prstGeom>
-              <a:solidFill>
-                <a:schemeClr val="accent1">
-                  <a:lumMod val="50000"/>
-                </a:schemeClr>
-              </a:solidFill>
-            </p:spPr>
-            <p:style>
-              <a:lnRef idx="2">
-                <a:schemeClr val="accent1">
-                  <a:shade val="50000"/>
-                </a:schemeClr>
-              </a:lnRef>
-              <a:fillRef idx="1">
-                <a:schemeClr val="accent1"/>
-              </a:fillRef>
-              <a:effectRef idx="0">
-                <a:schemeClr val="accent1"/>
-              </a:effectRef>
-              <a:fontRef idx="minor">
-                <a:schemeClr val="lt1"/>
-              </a:fontRef>
-            </p:style>
-            <p:txBody>
-              <a:bodyPr rtlCol="0" anchor="ctr"/>
-              <a:lstStyle/>
-              <a:p>
-                <a:pPr algn="ctr"/>
-                <a:endParaRPr lang="fr-FR" dirty="0"/>
-              </a:p>
-            </p:txBody>
-          </p:sp>
-          <p:sp>
-            <p:nvSpPr>
-              <p:cNvPr id="57" name="ZoneTexte 56">
-                <a:extLst>
-                  <a:ext uri="{FF2B5EF4-FFF2-40B4-BE49-F238E27FC236}">
-                    <a16:creationId xmlns:a16="http://schemas.microsoft.com/office/drawing/2014/main" id="{58D770DC-6079-4F1D-9700-D827408ED8EB}"/>
-                  </a:ext>
-                </a:extLst>
-              </p:cNvPr>
-              <p:cNvSpPr txBox="1"/>
-              <p:nvPr/>
-            </p:nvSpPr>
-            <p:spPr>
-              <a:xfrm>
-                <a:off x="7602278" y="12570092"/>
-                <a:ext cx="1283214" cy="830997"/>
-              </a:xfrm>
-              <a:prstGeom prst="rect">
-                <a:avLst/>
-              </a:prstGeom>
-              <a:solidFill>
-                <a:schemeClr val="accent1">
-                  <a:lumMod val="50000"/>
-                </a:schemeClr>
-              </a:solidFill>
-            </p:spPr>
-            <p:txBody>
-              <a:bodyPr wrap="square" rtlCol="0">
-                <a:spAutoFit/>
-              </a:bodyPr>
-              <a:lstStyle/>
-              <a:p>
-                <a:pPr algn="ctr"/>
-                <a:r>
-                  <a:rPr lang="fr-FR" sz="2400" b="1" dirty="0">
-                    <a:solidFill>
-                      <a:schemeClr val="bg1"/>
-                    </a:solidFill>
-                  </a:rPr>
-                  <a:t>Salle Encre </a:t>
-                </a:r>
-              </a:p>
-            </p:txBody>
-          </p:sp>
-        </p:grpSp>
-        <p:grpSp>
-          <p:nvGrpSpPr>
-            <p:cNvPr id="81" name="Groupe 80">
-              <a:extLst>
-                <a:ext uri="{FF2B5EF4-FFF2-40B4-BE49-F238E27FC236}">
-                  <a16:creationId xmlns:a16="http://schemas.microsoft.com/office/drawing/2014/main" id="{4C7C426E-F06F-40E6-AB3D-73F64DF7C18A}"/>
-                </a:ext>
-              </a:extLst>
-            </p:cNvPr>
-            <p:cNvGrpSpPr/>
-            <p:nvPr/>
-          </p:nvGrpSpPr>
-          <p:grpSpPr>
-            <a:xfrm>
-              <a:off x="6157821" y="13548651"/>
-              <a:ext cx="1580528" cy="994814"/>
-              <a:chOff x="5857965" y="13579175"/>
-              <a:chExt cx="1580528" cy="994814"/>
-            </a:xfrm>
-            <a:grpFill/>
-          </p:grpSpPr>
-          <p:sp>
-            <p:nvSpPr>
-              <p:cNvPr id="79" name="Rectangle : coins arrondis 78">
-                <a:extLst>
-                  <a:ext uri="{FF2B5EF4-FFF2-40B4-BE49-F238E27FC236}">
-                    <a16:creationId xmlns:a16="http://schemas.microsoft.com/office/drawing/2014/main" id="{E49E519E-C403-4887-B7DC-240247D38EA1}"/>
-                  </a:ext>
-                </a:extLst>
-              </p:cNvPr>
-              <p:cNvSpPr/>
-              <p:nvPr/>
-            </p:nvSpPr>
-            <p:spPr>
-              <a:xfrm>
-                <a:off x="5857965" y="13579175"/>
-                <a:ext cx="1580528" cy="994814"/>
-              </a:xfrm>
-              <a:prstGeom prst="roundRect">
-                <a:avLst/>
-              </a:prstGeom>
-              <a:solidFill>
-                <a:schemeClr val="accent1">
-                  <a:lumMod val="50000"/>
-                </a:schemeClr>
-              </a:solidFill>
-            </p:spPr>
-            <p:style>
-              <a:lnRef idx="2">
-                <a:schemeClr val="accent1">
-                  <a:shade val="50000"/>
-                </a:schemeClr>
-              </a:lnRef>
-              <a:fillRef idx="1">
-                <a:schemeClr val="accent1"/>
-              </a:fillRef>
-              <a:effectRef idx="0">
-                <a:schemeClr val="accent1"/>
-              </a:effectRef>
-              <a:fontRef idx="minor">
-                <a:schemeClr val="lt1"/>
-              </a:fontRef>
-            </p:style>
-            <p:txBody>
-              <a:bodyPr rtlCol="0" anchor="ctr"/>
-              <a:lstStyle/>
-              <a:p>
-                <a:pPr algn="ctr"/>
-                <a:endParaRPr lang="fr-FR" dirty="0"/>
-              </a:p>
-            </p:txBody>
-          </p:sp>
-          <p:sp>
-            <p:nvSpPr>
-              <p:cNvPr id="31" name="ZoneTexte 30">
-                <a:extLst>
-                  <a:ext uri="{FF2B5EF4-FFF2-40B4-BE49-F238E27FC236}">
-                    <a16:creationId xmlns:a16="http://schemas.microsoft.com/office/drawing/2014/main" id="{0392EF73-EBA4-44A5-9662-9E8E64AF1CEA}"/>
-                  </a:ext>
-                </a:extLst>
-              </p:cNvPr>
-              <p:cNvSpPr txBox="1"/>
-              <p:nvPr/>
-            </p:nvSpPr>
-            <p:spPr>
-              <a:xfrm>
-                <a:off x="5965916" y="13857127"/>
-                <a:ext cx="1364626" cy="461665"/>
-              </a:xfrm>
-              <a:prstGeom prst="rect">
-                <a:avLst/>
-              </a:prstGeom>
-              <a:solidFill>
-                <a:schemeClr val="accent1">
-                  <a:lumMod val="50000"/>
-                </a:schemeClr>
-              </a:solidFill>
-            </p:spPr>
-            <p:txBody>
-              <a:bodyPr wrap="square" rtlCol="0">
-                <a:spAutoFit/>
-              </a:bodyPr>
-              <a:lstStyle/>
-              <a:p>
-                <a:pPr algn="ctr"/>
-                <a:r>
-                  <a:rPr lang="fr-FR" sz="2400" b="1" dirty="0">
-                    <a:solidFill>
-                      <a:schemeClr val="bg1"/>
-                    </a:solidFill>
-                  </a:rPr>
-                  <a:t>Atelier </a:t>
-                </a:r>
-              </a:p>
-            </p:txBody>
-          </p:sp>
-        </p:grpSp>
-        <p:grpSp>
-          <p:nvGrpSpPr>
-            <p:cNvPr id="83" name="Groupe 82">
-              <a:extLst>
-                <a:ext uri="{FF2B5EF4-FFF2-40B4-BE49-F238E27FC236}">
-                  <a16:creationId xmlns:a16="http://schemas.microsoft.com/office/drawing/2014/main" id="{197906AE-1C0B-4BB8-B9DC-44EFA6CA32BC}"/>
-                </a:ext>
-              </a:extLst>
-            </p:cNvPr>
-            <p:cNvGrpSpPr/>
-            <p:nvPr/>
-          </p:nvGrpSpPr>
-          <p:grpSpPr>
-            <a:xfrm>
-              <a:off x="4685244" y="12398241"/>
-              <a:ext cx="1580528" cy="994814"/>
-              <a:chOff x="4504191" y="12488184"/>
-              <a:chExt cx="1580528" cy="994814"/>
-            </a:xfrm>
-            <a:grpFill/>
-          </p:grpSpPr>
-          <p:sp>
-            <p:nvSpPr>
-              <p:cNvPr id="77" name="Rectangle : coins arrondis 76">
-                <a:extLst>
-                  <a:ext uri="{FF2B5EF4-FFF2-40B4-BE49-F238E27FC236}">
-                    <a16:creationId xmlns:a16="http://schemas.microsoft.com/office/drawing/2014/main" id="{9BB30294-86ED-460E-9D3B-E5B6CFC43520}"/>
-                  </a:ext>
-                </a:extLst>
-              </p:cNvPr>
-              <p:cNvSpPr/>
-              <p:nvPr/>
-            </p:nvSpPr>
-            <p:spPr>
-              <a:xfrm>
-                <a:off x="4504191" y="12488184"/>
-                <a:ext cx="1580528" cy="994814"/>
-              </a:xfrm>
-              <a:prstGeom prst="roundRect">
-                <a:avLst/>
-              </a:prstGeom>
-              <a:solidFill>
-                <a:schemeClr val="accent1">
-                  <a:lumMod val="50000"/>
-                </a:schemeClr>
-              </a:solidFill>
-            </p:spPr>
-            <p:style>
-              <a:lnRef idx="2">
-                <a:schemeClr val="accent1">
-                  <a:shade val="50000"/>
-                </a:schemeClr>
-              </a:lnRef>
-              <a:fillRef idx="1">
-                <a:schemeClr val="accent1"/>
-              </a:fillRef>
-              <a:effectRef idx="0">
-                <a:schemeClr val="accent1"/>
-              </a:effectRef>
-              <a:fontRef idx="minor">
-                <a:schemeClr val="lt1"/>
-              </a:fontRef>
-            </p:style>
-            <p:txBody>
-              <a:bodyPr rtlCol="0" anchor="ctr"/>
-              <a:lstStyle/>
-              <a:p>
-                <a:pPr algn="ctr"/>
-                <a:endParaRPr lang="fr-FR" dirty="0"/>
-              </a:p>
-            </p:txBody>
-          </p:sp>
-          <p:sp>
-            <p:nvSpPr>
-              <p:cNvPr id="80" name="ZoneTexte 79">
-                <a:extLst>
-                  <a:ext uri="{FF2B5EF4-FFF2-40B4-BE49-F238E27FC236}">
-                    <a16:creationId xmlns:a16="http://schemas.microsoft.com/office/drawing/2014/main" id="{11758A3A-1010-4ABD-9067-4EB96EC56A01}"/>
-                  </a:ext>
-                </a:extLst>
-              </p:cNvPr>
-              <p:cNvSpPr txBox="1"/>
-              <p:nvPr/>
-            </p:nvSpPr>
-            <p:spPr>
-              <a:xfrm>
-                <a:off x="4652848" y="12570091"/>
-                <a:ext cx="1283214" cy="830997"/>
-              </a:xfrm>
-              <a:prstGeom prst="rect">
-                <a:avLst/>
-              </a:prstGeom>
-              <a:solidFill>
-                <a:schemeClr val="accent1">
-                  <a:lumMod val="50000"/>
-                </a:schemeClr>
-              </a:solidFill>
-              <a:ln>
-                <a:solidFill>
-                  <a:schemeClr val="accent1">
-                    <a:lumMod val="50000"/>
-                  </a:schemeClr>
-                </a:solidFill>
-              </a:ln>
-            </p:spPr>
-            <p:txBody>
-              <a:bodyPr wrap="square" rtlCol="0">
-                <a:spAutoFit/>
-              </a:bodyPr>
-              <a:lstStyle/>
-              <a:p>
-                <a:pPr algn="ctr"/>
-                <a:r>
-                  <a:rPr lang="fr-FR" sz="2400" b="1" dirty="0">
-                    <a:solidFill>
-                      <a:schemeClr val="bg1"/>
-                    </a:solidFill>
-                  </a:rPr>
-                  <a:t>Salle papier </a:t>
-                </a:r>
-              </a:p>
-            </p:txBody>
-          </p:sp>
-        </p:grpSp>
-      </p:grpSp>
-      <p:pic>
-        <p:nvPicPr>
-          <p:cNvPr id="91" name="Image 90">
-            <a:extLst>
-              <a:ext uri="{FF2B5EF4-FFF2-40B4-BE49-F238E27FC236}">
-                <a16:creationId xmlns:a16="http://schemas.microsoft.com/office/drawing/2014/main" id="{EC3C7F0F-FB19-430D-897A-BD70F5AABF8F}"/>
-              </a:ext>
-            </a:extLst>
-          </p:cNvPr>
-          <p:cNvPicPr>
-            <a:picLocks noChangeAspect="1"/>
-          </p:cNvPicPr>
-          <p:nvPr/>
-        </p:nvPicPr>
-        <p:blipFill>
-          <a:blip r:embed="rId8"/>
-          <a:stretch>
-            <a:fillRect/>
-          </a:stretch>
-        </p:blipFill>
-        <p:spPr>
-          <a:xfrm>
-            <a:off x="17208433" y="1797817"/>
-            <a:ext cx="3873998" cy="4722662"/>
-          </a:xfrm>
-          <a:prstGeom prst="rect">
-            <a:avLst/>
-          </a:prstGeom>
-        </p:spPr>
-      </p:pic>
-      <p:pic>
-        <p:nvPicPr>
-          <p:cNvPr id="96" name="Image 95">
-            <a:extLst>
-              <a:ext uri="{FF2B5EF4-FFF2-40B4-BE49-F238E27FC236}">
-                <a16:creationId xmlns:a16="http://schemas.microsoft.com/office/drawing/2014/main" id="{C5B74F7D-E588-4675-BB40-8A22C35C6FC5}"/>
-              </a:ext>
-            </a:extLst>
-          </p:cNvPr>
-          <p:cNvPicPr/>
-          <p:nvPr/>
-        </p:nvPicPr>
-        <p:blipFill rotWithShape="1">
-          <a:blip r:embed="rId9" cstate="print">
-            <a:extLst>
-              <a:ext uri="{28A0092B-C50C-407E-A947-70E740481C1C}">
-                <a14:useLocalDpi xmlns:a14="http://schemas.microsoft.com/office/drawing/2010/main" val="0"/>
-              </a:ext>
-            </a:extLst>
-          </a:blip>
-          <a:srcRect r="78862"/>
-          <a:stretch/>
-        </p:blipFill>
-        <p:spPr>
-          <a:xfrm>
-            <a:off x="5505272" y="12441396"/>
-            <a:ext cx="1430471" cy="1450975"/>
-          </a:xfrm>
-          <a:prstGeom prst="rect">
-            <a:avLst/>
-          </a:prstGeom>
-        </p:spPr>
-      </p:pic>
-      <p:pic>
-        <p:nvPicPr>
-          <p:cNvPr id="97" name="Image 96">
-            <a:extLst>
-              <a:ext uri="{FF2B5EF4-FFF2-40B4-BE49-F238E27FC236}">
-                <a16:creationId xmlns:a16="http://schemas.microsoft.com/office/drawing/2014/main" id="{BA231D71-01AD-401E-8730-17BBCFDEA026}"/>
-              </a:ext>
-            </a:extLst>
-          </p:cNvPr>
-          <p:cNvPicPr/>
-          <p:nvPr/>
-        </p:nvPicPr>
-        <p:blipFill rotWithShape="1">
-          <a:blip r:embed="rId9" cstate="print">
-            <a:extLst>
-              <a:ext uri="{28A0092B-C50C-407E-A947-70E740481C1C}">
-                <a14:useLocalDpi xmlns:a14="http://schemas.microsoft.com/office/drawing/2010/main" val="0"/>
-              </a:ext>
-            </a:extLst>
-          </a:blip>
-          <a:srcRect l="45391" r="33416" b="21990"/>
-          <a:stretch/>
-        </p:blipFill>
-        <p:spPr>
-          <a:xfrm>
-            <a:off x="8625533" y="12441396"/>
-            <a:ext cx="1434142" cy="1131908"/>
-          </a:xfrm>
-          <a:prstGeom prst="rect">
-            <a:avLst/>
-          </a:prstGeom>
-        </p:spPr>
-      </p:pic>
-      <p:pic>
-        <p:nvPicPr>
-          <p:cNvPr id="98" name="Image 97">
-            <a:extLst>
-              <a:ext uri="{FF2B5EF4-FFF2-40B4-BE49-F238E27FC236}">
-                <a16:creationId xmlns:a16="http://schemas.microsoft.com/office/drawing/2014/main" id="{3CBF28C5-86EE-47A4-9E90-FB47CD7DA3CC}"/>
-              </a:ext>
-            </a:extLst>
-          </p:cNvPr>
-          <p:cNvPicPr/>
-          <p:nvPr/>
-        </p:nvPicPr>
-        <p:blipFill rotWithShape="1">
-          <a:blip r:embed="rId9" cstate="print">
-            <a:extLst>
-              <a:ext uri="{28A0092B-C50C-407E-A947-70E740481C1C}">
-                <a14:useLocalDpi xmlns:a14="http://schemas.microsoft.com/office/drawing/2010/main" val="0"/>
-              </a:ext>
-            </a:extLst>
-          </a:blip>
-          <a:srcRect l="77368" b="22735"/>
-          <a:stretch/>
-        </p:blipFill>
-        <p:spPr>
-          <a:xfrm>
-            <a:off x="6925764" y="13360888"/>
-            <a:ext cx="1531579" cy="1121092"/>
-          </a:xfrm>
-          <a:prstGeom prst="rect">
-            <a:avLst/>
-          </a:prstGeom>
-        </p:spPr>
-      </p:pic>
-      <p:sp>
-        <p:nvSpPr>
-          <p:cNvPr id="100" name="ZoneTexte 99">
-            <a:extLst>
-              <a:ext uri="{FF2B5EF4-FFF2-40B4-BE49-F238E27FC236}">
-                <a16:creationId xmlns:a16="http://schemas.microsoft.com/office/drawing/2014/main" id="{080508F9-DB29-4EF4-9A36-79730233295F}"/>
-              </a:ext>
-            </a:extLst>
-          </p:cNvPr>
-          <p:cNvSpPr txBox="1"/>
-          <p:nvPr/>
-        </p:nvSpPr>
-        <p:spPr>
-          <a:xfrm>
-            <a:off x="1504079" y="11870036"/>
-            <a:ext cx="2541798" cy="400110"/>
-          </a:xfrm>
-          <a:prstGeom prst="rect">
-            <a:avLst/>
-          </a:prstGeom>
-          <a:noFill/>
-        </p:spPr>
-        <p:txBody>
-          <a:bodyPr wrap="square" rtlCol="0">
-            <a:spAutoFit/>
-          </a:bodyPr>
-          <a:lstStyle/>
-          <a:p>
-            <a:pPr algn="ctr"/>
-            <a:r>
-              <a:rPr lang="fr-FR" sz="2000" dirty="0"/>
-              <a:t>Old</a:t>
-            </a:r>
-          </a:p>
-        </p:txBody>
-      </p:sp>
-      <p:sp>
-        <p:nvSpPr>
-          <p:cNvPr id="101" name="ZoneTexte 100">
-            <a:extLst>
-              <a:ext uri="{FF2B5EF4-FFF2-40B4-BE49-F238E27FC236}">
-                <a16:creationId xmlns:a16="http://schemas.microsoft.com/office/drawing/2014/main" id="{BFC7D40F-6450-4640-9695-BF7474436A19}"/>
-              </a:ext>
-            </a:extLst>
-          </p:cNvPr>
-          <p:cNvSpPr txBox="1"/>
-          <p:nvPr/>
-        </p:nvSpPr>
-        <p:spPr>
-          <a:xfrm>
-            <a:off x="6576652" y="11811863"/>
-            <a:ext cx="2541798" cy="400110"/>
-          </a:xfrm>
-          <a:prstGeom prst="rect">
-            <a:avLst/>
-          </a:prstGeom>
-          <a:noFill/>
-        </p:spPr>
-        <p:txBody>
-          <a:bodyPr wrap="square" rtlCol="0">
-            <a:spAutoFit/>
-          </a:bodyPr>
-          <a:lstStyle/>
-          <a:p>
-            <a:pPr algn="ctr"/>
-            <a:r>
-              <a:rPr lang="fr-FR" sz="2000" dirty="0"/>
-              <a:t>Actuelle</a:t>
-            </a:r>
-          </a:p>
-        </p:txBody>
-      </p:sp>
-      <p:pic>
-        <p:nvPicPr>
-          <p:cNvPr id="109" name="Image 108">
-            <a:extLst>
-              <a:ext uri="{FF2B5EF4-FFF2-40B4-BE49-F238E27FC236}">
-                <a16:creationId xmlns:a16="http://schemas.microsoft.com/office/drawing/2014/main" id="{A21D5CF8-9EB1-42F3-92C9-837828F378F6}"/>
-              </a:ext>
-            </a:extLst>
-          </p:cNvPr>
-          <p:cNvPicPr>
-            <a:picLocks noChangeAspect="1"/>
-          </p:cNvPicPr>
-          <p:nvPr/>
-        </p:nvPicPr>
-        <p:blipFill>
-          <a:blip r:embed="rId10"/>
-          <a:stretch>
-            <a:fillRect/>
-          </a:stretch>
-        </p:blipFill>
-        <p:spPr>
-          <a:xfrm>
-            <a:off x="11147162" y="11182817"/>
-            <a:ext cx="5206637" cy="3772356"/>
-          </a:xfrm>
-          <a:prstGeom prst="rect">
-            <a:avLst/>
-          </a:prstGeom>
-        </p:spPr>
-      </p:pic>
-      <p:grpSp>
-        <p:nvGrpSpPr>
-          <p:cNvPr id="89" name="Groupe 88">
-            <a:extLst>
-              <a:ext uri="{FF2B5EF4-FFF2-40B4-BE49-F238E27FC236}">
-                <a16:creationId xmlns:a16="http://schemas.microsoft.com/office/drawing/2014/main" id="{B061B7F9-9F19-4F1E-A1F5-2B8D572361EB}"/>
-              </a:ext>
-            </a:extLst>
-          </p:cNvPr>
-          <p:cNvGrpSpPr/>
-          <p:nvPr/>
-        </p:nvGrpSpPr>
-        <p:grpSpPr>
-          <a:xfrm>
-            <a:off x="7626646" y="5592961"/>
-            <a:ext cx="6360275" cy="5745599"/>
-            <a:chOff x="7626646" y="5592961"/>
-            <a:chExt cx="6360275" cy="5745599"/>
-          </a:xfrm>
-        </p:grpSpPr>
-        <p:sp>
-          <p:nvSpPr>
-            <p:cNvPr id="4" name="Ellipse 3">
-              <a:extLst>
-                <a:ext uri="{FF2B5EF4-FFF2-40B4-BE49-F238E27FC236}">
-                  <a16:creationId xmlns:a16="http://schemas.microsoft.com/office/drawing/2014/main" id="{229EE5AC-ABE7-4DFD-986F-200C2BC10C4D}"/>
-                </a:ext>
-              </a:extLst>
-            </p:cNvPr>
-            <p:cNvSpPr/>
-            <p:nvPr/>
-          </p:nvSpPr>
-          <p:spPr>
-            <a:xfrm>
-              <a:off x="7626646" y="5592961"/>
-              <a:ext cx="6360275" cy="5745599"/>
-            </a:xfrm>
-            <a:prstGeom prst="ellipse">
-              <a:avLst/>
-            </a:prstGeom>
-          </p:spPr>
-          <p:style>
-            <a:lnRef idx="2">
-              <a:schemeClr val="dk1"/>
-            </a:lnRef>
-            <a:fillRef idx="1">
-              <a:schemeClr val="lt1"/>
-            </a:fillRef>
-            <a:effectRef idx="0">
-              <a:schemeClr val="dk1"/>
-            </a:effectRef>
-            <a:fontRef idx="minor">
-              <a:schemeClr val="dk1"/>
-            </a:fontRef>
-          </p:style>
-          <p:txBody>
-            <a:bodyPr rtlCol="0" anchor="ctr"/>
-            <a:lstStyle/>
-            <a:p>
-              <a:pPr algn="ctr"/>
-              <a:endParaRPr lang="fr-FR" b="1" dirty="0"/>
-            </a:p>
-            <a:p>
-              <a:pPr algn="ctr"/>
-              <a:endParaRPr lang="fr-FR" b="1" dirty="0"/>
-            </a:p>
-            <a:p>
-              <a:pPr algn="ctr"/>
-              <a:endParaRPr lang="fr-FR" b="1" dirty="0"/>
-            </a:p>
-          </p:txBody>
-        </p:sp>
-        <p:sp>
-          <p:nvSpPr>
-            <p:cNvPr id="46" name="ZoneTexte 45">
-              <a:extLst>
-                <a:ext uri="{FF2B5EF4-FFF2-40B4-BE49-F238E27FC236}">
-                  <a16:creationId xmlns:a16="http://schemas.microsoft.com/office/drawing/2014/main" id="{9A406C76-B2AB-461A-BBD0-DA45BDDC2607}"/>
-                </a:ext>
-              </a:extLst>
-            </p:cNvPr>
-            <p:cNvSpPr txBox="1"/>
-            <p:nvPr/>
-          </p:nvSpPr>
-          <p:spPr>
-            <a:xfrm>
-              <a:off x="9293136" y="10010786"/>
-              <a:ext cx="2900225" cy="954107"/>
-            </a:xfrm>
-            <a:prstGeom prst="rect">
-              <a:avLst/>
-            </a:prstGeom>
-            <a:noFill/>
-          </p:spPr>
-          <p:txBody>
-            <a:bodyPr wrap="square" rtlCol="0">
-              <a:spAutoFit/>
-            </a:bodyPr>
-            <a:lstStyle/>
-            <a:p>
-              <a:pPr algn="ctr"/>
-              <a:r>
-                <a:rPr lang="fr-FR" sz="2800" dirty="0"/>
-                <a:t>Flavio </a:t>
-              </a:r>
-              <a:r>
-                <a:rPr lang="fr-FR" sz="2800" dirty="0" err="1"/>
-                <a:t>Ranchon</a:t>
-              </a:r>
-              <a:endParaRPr lang="fr-FR" sz="2800" dirty="0"/>
-            </a:p>
-            <a:p>
-              <a:pPr algn="ctr"/>
-              <a:r>
-                <a:rPr lang="fr-FR" sz="2800" dirty="0"/>
-                <a:t>Jaël Vavasseur</a:t>
-              </a:r>
-            </a:p>
-          </p:txBody>
-        </p:sp>
-        <p:pic>
-          <p:nvPicPr>
-            <p:cNvPr id="47" name="Image 46">
-              <a:extLst>
-                <a:ext uri="{FF2B5EF4-FFF2-40B4-BE49-F238E27FC236}">
-                  <a16:creationId xmlns:a16="http://schemas.microsoft.com/office/drawing/2014/main" id="{A8EACDF2-19E6-4A7A-95DB-974084778036}"/>
-                </a:ext>
-              </a:extLst>
-            </p:cNvPr>
-            <p:cNvPicPr>
-              <a:picLocks noChangeAspect="1"/>
-            </p:cNvPicPr>
-            <p:nvPr/>
-          </p:nvPicPr>
-          <p:blipFill>
-            <a:blip r:embed="rId11"/>
-            <a:stretch>
-              <a:fillRect/>
-            </a:stretch>
-          </p:blipFill>
-          <p:spPr>
-            <a:xfrm>
-              <a:off x="9342604" y="6974461"/>
-              <a:ext cx="2900226" cy="2818401"/>
-            </a:xfrm>
-            <a:prstGeom prst="rect">
-              <a:avLst/>
-            </a:prstGeom>
-          </p:spPr>
-        </p:pic>
-        <p:pic>
-          <p:nvPicPr>
-            <p:cNvPr id="65" name="Image 64">
-              <a:extLst>
-                <a:ext uri="{FF2B5EF4-FFF2-40B4-BE49-F238E27FC236}">
-                  <a16:creationId xmlns:a16="http://schemas.microsoft.com/office/drawing/2014/main" id="{95F81185-164F-4741-A401-6C5164740E90}"/>
-                </a:ext>
-              </a:extLst>
-            </p:cNvPr>
-            <p:cNvPicPr>
-              <a:picLocks noChangeAspect="1"/>
-            </p:cNvPicPr>
-            <p:nvPr/>
-          </p:nvPicPr>
-          <p:blipFill>
-            <a:blip r:embed="rId12"/>
-            <a:stretch>
-              <a:fillRect/>
-            </a:stretch>
-          </p:blipFill>
-          <p:spPr>
-            <a:xfrm>
-              <a:off x="9041603" y="6119130"/>
-              <a:ext cx="3502228" cy="677168"/>
-            </a:xfrm>
-            <a:prstGeom prst="rect">
-              <a:avLst/>
-            </a:prstGeom>
-          </p:spPr>
-        </p:pic>
-      </p:grpSp>
-      <p:pic>
-        <p:nvPicPr>
-          <p:cNvPr id="102" name="Image 101">
-            <a:extLst>
-              <a:ext uri="{FF2B5EF4-FFF2-40B4-BE49-F238E27FC236}">
-                <a16:creationId xmlns:a16="http://schemas.microsoft.com/office/drawing/2014/main" id="{A8FB3516-C8F7-464E-8F6E-ED6FF8B53F96}"/>
-              </a:ext>
-            </a:extLst>
-          </p:cNvPr>
-          <p:cNvPicPr/>
-          <p:nvPr/>
-        </p:nvPicPr>
-        <p:blipFill>
-          <a:blip r:embed="rId13">
-            <a:extLst>
-              <a:ext uri="{28A0092B-C50C-407E-A947-70E740481C1C}">
-                <a14:useLocalDpi xmlns:a14="http://schemas.microsoft.com/office/drawing/2010/main" val="0"/>
-              </a:ext>
-            </a:extLst>
-          </a:blip>
-          <a:stretch>
-            <a:fillRect/>
-          </a:stretch>
-        </p:blipFill>
-        <p:spPr>
-          <a:xfrm>
-            <a:off x="14328073" y="7084875"/>
-            <a:ext cx="5760720" cy="3809365"/>
-          </a:xfrm>
-          <a:prstGeom prst="rect">
-            <a:avLst/>
-          </a:prstGeom>
-        </p:spPr>
-      </p:pic>
-      <p:grpSp>
-        <p:nvGrpSpPr>
-          <p:cNvPr id="115" name="Groupe 114">
-            <a:extLst>
-              <a:ext uri="{FF2B5EF4-FFF2-40B4-BE49-F238E27FC236}">
-                <a16:creationId xmlns:a16="http://schemas.microsoft.com/office/drawing/2014/main" id="{CEDDFD67-74E7-4D07-A3E2-4E3F36F302F9}"/>
-              </a:ext>
-            </a:extLst>
-          </p:cNvPr>
-          <p:cNvGrpSpPr/>
-          <p:nvPr/>
-        </p:nvGrpSpPr>
-        <p:grpSpPr>
-          <a:xfrm>
-            <a:off x="16313877" y="9676672"/>
-            <a:ext cx="5054892" cy="5442678"/>
-            <a:chOff x="0" y="0"/>
-            <a:chExt cx="5932968" cy="6273209"/>
-          </a:xfrm>
-        </p:grpSpPr>
-        <p:grpSp>
-          <p:nvGrpSpPr>
-            <p:cNvPr id="116" name="Groupe 115">
-              <a:extLst>
-                <a:ext uri="{FF2B5EF4-FFF2-40B4-BE49-F238E27FC236}">
-                  <a16:creationId xmlns:a16="http://schemas.microsoft.com/office/drawing/2014/main" id="{739FEE4D-4DF1-4FED-A800-871CF6B40ACF}"/>
-                </a:ext>
-              </a:extLst>
-            </p:cNvPr>
-            <p:cNvGrpSpPr/>
-            <p:nvPr/>
-          </p:nvGrpSpPr>
-          <p:grpSpPr>
-            <a:xfrm>
-              <a:off x="0" y="0"/>
-              <a:ext cx="5813883" cy="6210699"/>
-              <a:chOff x="0" y="0"/>
-              <a:chExt cx="5813883" cy="6210699"/>
-            </a:xfrm>
-          </p:grpSpPr>
-          <p:pic>
-            <p:nvPicPr>
-              <p:cNvPr id="118" name="Image 117">
-                <a:extLst>
-                  <a:ext uri="{FF2B5EF4-FFF2-40B4-BE49-F238E27FC236}">
-                    <a16:creationId xmlns:a16="http://schemas.microsoft.com/office/drawing/2014/main" id="{7FB1D00D-4FFE-4F2A-85AF-C45D5BD9588E}"/>
-                  </a:ext>
-                </a:extLst>
-              </p:cNvPr>
-              <p:cNvPicPr>
-                <a:picLocks noChangeAspect="1"/>
-              </p:cNvPicPr>
-              <p:nvPr/>
-            </p:nvPicPr>
-            <p:blipFill>
-              <a:blip r:embed="rId14">
-                <a:extLst>
-                  <a:ext uri="{28A0092B-C50C-407E-A947-70E740481C1C}">
-                    <a14:useLocalDpi xmlns:a14="http://schemas.microsoft.com/office/drawing/2010/main" val="0"/>
-                  </a:ext>
-                </a:extLst>
-              </a:blip>
-              <a:stretch>
-                <a:fillRect/>
-              </a:stretch>
-            </p:blipFill>
-            <p:spPr>
-              <a:xfrm>
-                <a:off x="53163" y="4319034"/>
-                <a:ext cx="5760720" cy="1891665"/>
-              </a:xfrm>
-              <a:prstGeom prst="rect">
-                <a:avLst/>
-              </a:prstGeom>
-            </p:spPr>
-          </p:pic>
-          <p:pic>
-            <p:nvPicPr>
-              <p:cNvPr id="119" name="Image 118">
-                <a:extLst>
-                  <a:ext uri="{FF2B5EF4-FFF2-40B4-BE49-F238E27FC236}">
-                    <a16:creationId xmlns:a16="http://schemas.microsoft.com/office/drawing/2014/main" id="{D337BE63-B7A8-4AB0-85F4-14F1C5DE64D9}"/>
-                  </a:ext>
-                </a:extLst>
-              </p:cNvPr>
-              <p:cNvPicPr>
-                <a:picLocks noChangeAspect="1"/>
-              </p:cNvPicPr>
-              <p:nvPr/>
-            </p:nvPicPr>
-            <p:blipFill rotWithShape="1">
-              <a:blip r:embed="rId15">
-                <a:extLst>
-                  <a:ext uri="{28A0092B-C50C-407E-A947-70E740481C1C}">
-                    <a14:useLocalDpi xmlns:a14="http://schemas.microsoft.com/office/drawing/2010/main" val="0"/>
-                  </a:ext>
-                </a:extLst>
-              </a:blip>
-              <a:srcRect b="21218"/>
-              <a:stretch/>
-            </p:blipFill>
-            <p:spPr bwMode="auto">
-              <a:xfrm>
-                <a:off x="0" y="0"/>
-                <a:ext cx="5760720" cy="4316730"/>
-              </a:xfrm>
-              <a:prstGeom prst="rect">
-                <a:avLst/>
-              </a:prstGeom>
-              <a:ln>
-                <a:noFill/>
-              </a:ln>
-              <a:extLst>
-                <a:ext uri="{53640926-AAD7-44D8-BBD7-CCE9431645EC}">
-                  <a14:shadowObscured xmlns:a14="http://schemas.microsoft.com/office/drawing/2010/main"/>
-                </a:ext>
-              </a:extLst>
-            </p:spPr>
-          </p:pic>
-        </p:grpSp>
-        <p:sp>
-          <p:nvSpPr>
-            <p:cNvPr id="117" name="Rectangle 116">
-              <a:extLst>
-                <a:ext uri="{FF2B5EF4-FFF2-40B4-BE49-F238E27FC236}">
-                  <a16:creationId xmlns:a16="http://schemas.microsoft.com/office/drawing/2014/main" id="{A6152799-4665-4760-B108-DBAD77CD4EB1}"/>
-                </a:ext>
-              </a:extLst>
-            </p:cNvPr>
-            <p:cNvSpPr/>
-            <p:nvPr/>
-          </p:nvSpPr>
-          <p:spPr>
-            <a:xfrm>
-              <a:off x="5635256" y="5964865"/>
-              <a:ext cx="297712" cy="308344"/>
-            </a:xfrm>
-            <a:prstGeom prst="rect">
-              <a:avLst/>
-            </a:prstGeom>
-            <a:ln>
-              <a:solidFill>
-                <a:schemeClr val="bg1"/>
-              </a:solidFill>
-            </a:ln>
-          </p:spPr>
-          <p:style>
-            <a:lnRef idx="2">
-              <a:schemeClr val="dk1"/>
-            </a:lnRef>
-            <a:fillRef idx="1">
-              <a:schemeClr val="lt1"/>
-            </a:fillRef>
-            <a:effectRef idx="0">
-              <a:schemeClr val="dk1"/>
-            </a:effectRef>
-            <a:fontRef idx="minor">
-              <a:schemeClr val="dk1"/>
-            </a:fontRef>
-          </p:style>
-          <p:txBody>
-            <a:bodyPr rot="0" spcFirstLastPara="0" vert="horz" wrap="square" lIns="91440" tIns="45720" rIns="91440" bIns="45720" numCol="1" spcCol="0" rtlCol="0" fromWordArt="0" anchor="ctr" anchorCtr="0" forceAA="0" compatLnSpc="1">
-              <a:prstTxWarp prst="textNoShape">
-                <a:avLst/>
-              </a:prstTxWarp>
-              <a:noAutofit/>
-            </a:bodyPr>
-            <a:lstStyle/>
-            <a:p>
-              <a:endParaRPr lang="fr-FR"/>
-            </a:p>
-          </p:txBody>
-        </p:sp>
-      </p:grpSp>
-    </p:spTree>
-    <p:extLst>
-      <p:ext uri="{BB962C8B-B14F-4D97-AF65-F5344CB8AC3E}">
-        <p14:creationId xmlns:p14="http://schemas.microsoft.com/office/powerpoint/2010/main" val="939056726"/>
-      </p:ext>
-    </p:extLst>
-  </p:cSld>
-  <p:clrMapOvr>
-    <a:masterClrMapping/>
-  </p:clrMapOvr>
-</p:sld>
-</file>
-
-<file path=ppt/slides/slide2.xml><?xml version="1.0" encoding="utf-8"?>
-<p:sld xmlns:a="http://schemas.openxmlformats.org/drawingml/2006/main" xmlns:r="http://schemas.openxmlformats.org/officeDocument/2006/relationships" xmlns:p="http://schemas.openxmlformats.org/presentationml/2006/main">
-  <p:cSld>
-    <p:spTree>
-      <p:nvGrpSpPr>
-        <p:cNvPr id="1" name=""/>
-        <p:cNvGrpSpPr/>
-        <p:nvPr/>
-      </p:nvGrpSpPr>
-      <p:grpSpPr>
-        <a:xfrm>
-          <a:off x="0" y="0"/>
-          <a:ext cx="0" cy="0"/>
-          <a:chOff x="0" y="0"/>
-          <a:chExt cx="0" cy="0"/>
-        </a:xfrm>
-      </p:grpSpPr>
       <p:sp>
         <p:nvSpPr>
           <p:cNvPr id="4" name="ZoneTexte 3">
@@ -8567,7 +6051,7 @@
         <p:spPr>
           <a:xfrm>
             <a:off x="4717381" y="331466"/>
-            <a:ext cx="9962936" cy="1938992"/>
+            <a:ext cx="9962936" cy="1815882"/>
           </a:xfrm>
           <a:prstGeom prst="rect">
             <a:avLst/>
@@ -8582,14 +6066,24 @@
           <a:p>
             <a:pPr algn="ctr"/>
             <a:r>
-              <a:rPr lang="fr-FR" sz="4000" dirty="0" err="1">
+              <a:rPr lang="fr-FR" sz="3600" dirty="0" err="1">
+                <a:solidFill>
+                  <a:schemeClr val="bg1">
+                    <a:lumMod val="65000"/>
+                  </a:schemeClr>
+                </a:solidFill>
                 <a:latin typeface="Lucida Sans Unicode" panose="020B0602030504020204" pitchFamily="34" charset="0"/>
                 <a:cs typeface="Lucida Sans Unicode" panose="020B0602030504020204" pitchFamily="34" charset="0"/>
               </a:rPr>
               <a:t>Profan</a:t>
             </a:r>
             <a:r>
-              <a:rPr lang="fr-FR" sz="4000" dirty="0">
+              <a:rPr lang="fr-FR" sz="3600" dirty="0">
+                <a:solidFill>
+                  <a:schemeClr val="bg1">
+                    <a:lumMod val="65000"/>
+                  </a:schemeClr>
+                </a:solidFill>
                 <a:latin typeface="Lucida Sans Unicode" panose="020B0602030504020204" pitchFamily="34" charset="0"/>
                 <a:cs typeface="Lucida Sans Unicode" panose="020B0602030504020204" pitchFamily="34" charset="0"/>
               </a:rPr>
@@ -8599,7 +6093,12 @@
           <a:p>
             <a:pPr algn="ctr"/>
             <a:r>
-              <a:rPr lang="fr-FR" sz="4000" dirty="0">
+              <a:rPr lang="fr-FR" sz="3600" dirty="0">
+                <a:solidFill>
+                  <a:schemeClr val="bg1">
+                    <a:lumMod val="65000"/>
+                  </a:schemeClr>
+                </a:solidFill>
                 <a:latin typeface="Lucida Sans Unicode" panose="020B0602030504020204" pitchFamily="34" charset="0"/>
                 <a:cs typeface="Lucida Sans Unicode" panose="020B0602030504020204" pitchFamily="34" charset="0"/>
               </a:rPr>
@@ -8643,8 +6142,8 @@
         </p:nvSpPr>
         <p:spPr>
           <a:xfrm>
-            <a:off x="928511" y="3147854"/>
-            <a:ext cx="5785121" cy="2185214"/>
+            <a:off x="662824" y="3238470"/>
+            <a:ext cx="5503624" cy="2185214"/>
           </a:xfrm>
           <a:prstGeom prst="rect">
             <a:avLst/>
@@ -8769,7 +6268,7 @@
           </p:blipFill>
           <p:spPr>
             <a:xfrm>
-              <a:off x="1671881" y="228619"/>
+              <a:off x="1690169" y="228619"/>
               <a:ext cx="2552722" cy="493577"/>
             </a:xfrm>
             <a:prstGeom prst="rect">
@@ -8792,7 +6291,7 @@
         </p:nvGrpSpPr>
         <p:grpSpPr>
           <a:xfrm>
-            <a:off x="1064956" y="5684674"/>
+            <a:off x="937302" y="5593904"/>
             <a:ext cx="4954668" cy="2890721"/>
             <a:chOff x="4470751" y="11775711"/>
             <a:chExt cx="4954668" cy="2890721"/>
@@ -9266,7 +6765,7 @@
         </p:nvGrpSpPr>
         <p:grpSpPr>
           <a:xfrm>
-            <a:off x="928511" y="11590034"/>
+            <a:off x="1056851" y="11426608"/>
             <a:ext cx="4715570" cy="3244796"/>
             <a:chOff x="578885" y="1594338"/>
             <a:chExt cx="4715570" cy="3244796"/>
@@ -9540,7 +7039,7 @@
         <p:spPr>
           <a:xfrm>
             <a:off x="662824" y="8660505"/>
-            <a:ext cx="5486041" cy="2462213"/>
+            <a:ext cx="5503624" cy="2462213"/>
           </a:xfrm>
           <a:prstGeom prst="rect">
             <a:avLst/>
@@ -9574,7 +7073,7 @@
                 <a:latin typeface="Calibri" panose="020F0502020204030204" pitchFamily="34" charset="0"/>
                 <a:cs typeface="Calibri" panose="020F0502020204030204" pitchFamily="34" charset="0"/>
               </a:rPr>
-              <a:t>	La solution doit pouvoir être disponible depuis n’importe quel appareil et depuis n’importe où. Nous avons dont opté pour une application web </a:t>
+              <a:t>	La solution doit pouvoir être disponible depuis n’importe quel appareil et depuis n’importe où. Nous avons donc opté pour une application web </a:t>
             </a:r>
             <a:r>
               <a:rPr lang="fr-FR" dirty="0" err="1">
@@ -9635,7 +7134,7 @@
         </p:nvSpPr>
         <p:spPr>
           <a:xfrm>
-            <a:off x="7202537" y="2647476"/>
+            <a:off x="7202537" y="2428020"/>
             <a:ext cx="5785121" cy="2739211"/>
           </a:xfrm>
           <a:prstGeom prst="rect">
@@ -9670,17 +7169,222 @@
                 <a:latin typeface="Calibri" panose="020F0502020204030204" pitchFamily="34" charset="0"/>
                 <a:cs typeface="Calibri" panose="020F0502020204030204" pitchFamily="34" charset="0"/>
               </a:rPr>
-              <a:t>	Nous avons du élaborer une structure de données pour concevoir notre base de données. Nous avons séparé dans un premier temps 3 types de produits, le papier, les encres et les autres. Cela rendant fastidieuse l’utilisation de l’application, nous avons finalement opté pour une structure regroupant tous les produits dans une même table avec un nombre minimal d’arguments.</a:t>
+              <a:t>	Nous avons du élaborer une structure de données pour concevoir notre base de données. Nous avons séparé dans un premier temps 3 types de produits, le papier, les encres et les autres. Cela rendait fastidieuse l’utilisation de l’application, nous avons finalement opté pour une structure regroupant tous les produits dans une même table avec un nombre minimal d’arguments.</a:t>
+            </a:r>
+          </a:p>
+        </p:txBody>
+      </p:sp>
+      <p:sp>
+        <p:nvSpPr>
+          <p:cNvPr id="49" name="ZoneTexte 48">
+            <a:extLst>
+              <a:ext uri="{FF2B5EF4-FFF2-40B4-BE49-F238E27FC236}">
+                <a16:creationId xmlns:a16="http://schemas.microsoft.com/office/drawing/2014/main" id="{04096620-DD58-45B8-87C9-E4C58D7702C8}"/>
+              </a:ext>
+            </a:extLst>
+          </p:cNvPr>
+          <p:cNvSpPr txBox="1"/>
+          <p:nvPr/>
+        </p:nvSpPr>
+        <p:spPr>
+          <a:xfrm>
+            <a:off x="7160332" y="9693195"/>
+            <a:ext cx="5822838" cy="2185214"/>
+          </a:xfrm>
+          <a:prstGeom prst="rect">
+            <a:avLst/>
+          </a:prstGeom>
+          <a:noFill/>
+        </p:spPr>
+        <p:txBody>
+          <a:bodyPr wrap="square" rtlCol="0">
+            <a:spAutoFit/>
+          </a:bodyPr>
+          <a:lstStyle/>
+          <a:p>
+            <a:r>
+              <a:rPr lang="fr-FR" sz="2800" b="1" dirty="0">
+                <a:latin typeface="Calibri" panose="020F0502020204030204" pitchFamily="34" charset="0"/>
+                <a:cs typeface="Calibri" panose="020F0502020204030204" pitchFamily="34" charset="0"/>
+              </a:rPr>
+              <a:t>4. Les droits</a:t>
+            </a:r>
+          </a:p>
+          <a:p>
+            <a:endParaRPr lang="fr-FR" dirty="0">
+              <a:latin typeface="Calibri" panose="020F0502020204030204" pitchFamily="34" charset="0"/>
+              <a:cs typeface="Calibri" panose="020F0502020204030204" pitchFamily="34" charset="0"/>
+            </a:endParaRPr>
+          </a:p>
+          <a:p>
+            <a:pPr algn="just"/>
+            <a:r>
+              <a:rPr lang="fr-FR" dirty="0">
+                <a:latin typeface="Calibri" panose="020F0502020204030204" pitchFamily="34" charset="0"/>
+                <a:cs typeface="Calibri" panose="020F0502020204030204" pitchFamily="34" charset="0"/>
+              </a:rPr>
+              <a:t>Il existe 3 types de comptes utilisateurs possédant les droits nécessaires à leur utilisation dans l’imprimerie:</a:t>
+            </a:r>
+          </a:p>
+          <a:p>
+            <a:pPr marL="742950" lvl="1" indent="-285750">
+              <a:buFont typeface="Arial" panose="020B0604020202020204" pitchFamily="34" charset="0"/>
+              <a:buChar char="•"/>
+            </a:pPr>
+            <a:r>
+              <a:rPr lang="fr-FR" dirty="0">
+                <a:latin typeface="Calibri" panose="020F0502020204030204" pitchFamily="34" charset="0"/>
+                <a:cs typeface="Calibri" panose="020F0502020204030204" pitchFamily="34" charset="0"/>
+              </a:rPr>
+              <a:t>Administrateur</a:t>
+            </a:r>
+          </a:p>
+          <a:p>
+            <a:pPr marL="742950" lvl="1" indent="-285750">
+              <a:buFont typeface="Arial" panose="020B0604020202020204" pitchFamily="34" charset="0"/>
+              <a:buChar char="•"/>
+            </a:pPr>
+            <a:r>
+              <a:rPr lang="fr-FR" dirty="0">
+                <a:latin typeface="Calibri" panose="020F0502020204030204" pitchFamily="34" charset="0"/>
+                <a:cs typeface="Calibri" panose="020F0502020204030204" pitchFamily="34" charset="0"/>
+              </a:rPr>
+              <a:t>Professeur</a:t>
+            </a:r>
+          </a:p>
+          <a:p>
+            <a:pPr marL="742950" lvl="1" indent="-285750">
+              <a:buFont typeface="Arial" panose="020B0604020202020204" pitchFamily="34" charset="0"/>
+              <a:buChar char="•"/>
+            </a:pPr>
+            <a:r>
+              <a:rPr lang="fr-FR" dirty="0">
+                <a:latin typeface="Calibri" panose="020F0502020204030204" pitchFamily="34" charset="0"/>
+                <a:cs typeface="Calibri" panose="020F0502020204030204" pitchFamily="34" charset="0"/>
+              </a:rPr>
+              <a:t>Etudiant</a:t>
+            </a:r>
+          </a:p>
+        </p:txBody>
+      </p:sp>
+      <p:sp>
+        <p:nvSpPr>
+          <p:cNvPr id="51" name="ZoneTexte 50">
+            <a:extLst>
+              <a:ext uri="{FF2B5EF4-FFF2-40B4-BE49-F238E27FC236}">
+                <a16:creationId xmlns:a16="http://schemas.microsoft.com/office/drawing/2014/main" id="{938FE817-A0CB-4537-8BF5-F0C5DE085F93}"/>
+              </a:ext>
+            </a:extLst>
+          </p:cNvPr>
+          <p:cNvSpPr txBox="1"/>
+          <p:nvPr/>
+        </p:nvSpPr>
+        <p:spPr>
+          <a:xfrm>
+            <a:off x="7202536" y="11942060"/>
+            <a:ext cx="6165991" cy="3016210"/>
+          </a:xfrm>
+          <a:prstGeom prst="rect">
+            <a:avLst/>
+          </a:prstGeom>
+          <a:noFill/>
+        </p:spPr>
+        <p:txBody>
+          <a:bodyPr wrap="square" rtlCol="0">
+            <a:spAutoFit/>
+          </a:bodyPr>
+          <a:lstStyle/>
+          <a:p>
+            <a:r>
+              <a:rPr lang="fr-FR" sz="2800" b="1" dirty="0">
+                <a:latin typeface="Calibri" panose="020F0502020204030204" pitchFamily="34" charset="0"/>
+                <a:cs typeface="Calibri" panose="020F0502020204030204" pitchFamily="34" charset="0"/>
+              </a:rPr>
+              <a:t>5. Résultat</a:t>
+            </a:r>
+          </a:p>
+          <a:p>
+            <a:endParaRPr lang="fr-FR" dirty="0">
+              <a:latin typeface="Calibri" panose="020F0502020204030204" pitchFamily="34" charset="0"/>
+              <a:cs typeface="Calibri" panose="020F0502020204030204" pitchFamily="34" charset="0"/>
+            </a:endParaRPr>
+          </a:p>
+          <a:p>
+            <a:pPr algn="just"/>
+            <a:r>
+              <a:rPr lang="fr-FR" dirty="0">
+                <a:latin typeface="Calibri" panose="020F0502020204030204" pitchFamily="34" charset="0"/>
+                <a:cs typeface="Calibri" panose="020F0502020204030204" pitchFamily="34" charset="0"/>
+              </a:rPr>
+              <a:t>	Notre application web comporte plusieurs pages ayant des fonctions pour effectuer chacun des points précisés dans le cahier des charges voire plus. </a:t>
+            </a:r>
+          </a:p>
+          <a:p>
+            <a:endParaRPr lang="fr-FR" dirty="0">
+              <a:latin typeface="Calibri" panose="020F0502020204030204" pitchFamily="34" charset="0"/>
+              <a:cs typeface="Calibri" panose="020F0502020204030204" pitchFamily="34" charset="0"/>
+            </a:endParaRPr>
+          </a:p>
+          <a:p>
+            <a:pPr marL="285750" indent="-285750">
+              <a:buFont typeface="Arial" panose="020B0604020202020204" pitchFamily="34" charset="0"/>
+              <a:buChar char="•"/>
+            </a:pPr>
+            <a:r>
+              <a:rPr lang="fr-FR" dirty="0">
+                <a:latin typeface="Calibri" panose="020F0502020204030204" pitchFamily="34" charset="0"/>
+                <a:cs typeface="Calibri" panose="020F0502020204030204" pitchFamily="34" charset="0"/>
+              </a:rPr>
+              <a:t>Accueil : Historique des modifications</a:t>
+            </a:r>
+          </a:p>
+          <a:p>
+            <a:pPr marL="285750" indent="-285750">
+              <a:buFont typeface="Arial" panose="020B0604020202020204" pitchFamily="34" charset="0"/>
+              <a:buChar char="•"/>
+            </a:pPr>
+            <a:r>
+              <a:rPr lang="fr-FR" dirty="0">
+                <a:latin typeface="Calibri" panose="020F0502020204030204" pitchFamily="34" charset="0"/>
+                <a:cs typeface="Calibri" panose="020F0502020204030204" pitchFamily="34" charset="0"/>
+              </a:rPr>
+              <a:t>Stock : Accès à la liste des produits en stock</a:t>
+            </a:r>
+          </a:p>
+          <a:p>
+            <a:pPr marL="285750" indent="-285750">
+              <a:buFont typeface="Arial" panose="020B0604020202020204" pitchFamily="34" charset="0"/>
+              <a:buChar char="•"/>
+            </a:pPr>
+            <a:r>
+              <a:rPr lang="fr-FR" dirty="0">
+                <a:latin typeface="Calibri" panose="020F0502020204030204" pitchFamily="34" charset="0"/>
+                <a:cs typeface="Calibri" panose="020F0502020204030204" pitchFamily="34" charset="0"/>
+              </a:rPr>
+              <a:t>Tutoriel : Documentation du site</a:t>
+            </a:r>
+          </a:p>
+          <a:p>
+            <a:pPr marL="285750" indent="-285750">
+              <a:buFont typeface="Arial" panose="020B0604020202020204" pitchFamily="34" charset="0"/>
+              <a:buChar char="•"/>
+            </a:pPr>
+            <a:r>
+              <a:rPr lang="fr-FR" dirty="0">
+                <a:latin typeface="Calibri" panose="020F0502020204030204" pitchFamily="34" charset="0"/>
+                <a:cs typeface="Calibri" panose="020F0502020204030204" pitchFamily="34" charset="0"/>
+              </a:rPr>
+              <a:t>Utilisateurs : Gestion des utilisateurs</a:t>
             </a:r>
           </a:p>
         </p:txBody>
       </p:sp>
       <p:pic>
         <p:nvPicPr>
-          <p:cNvPr id="48" name="Image 47">
+          <p:cNvPr id="55" name="Image 54">
             <a:extLst>
               <a:ext uri="{FF2B5EF4-FFF2-40B4-BE49-F238E27FC236}">
-                <a16:creationId xmlns:a16="http://schemas.microsoft.com/office/drawing/2014/main" id="{97F171C5-E990-473F-8296-2761BF0BB249}"/>
+                <a16:creationId xmlns:a16="http://schemas.microsoft.com/office/drawing/2014/main" id="{A1A89E08-B875-44C8-AF9A-14B5D3A44699}"/>
               </a:ext>
             </a:extLst>
           </p:cNvPr>
@@ -9690,239 +7394,39 @@
           <p:nvPr/>
         </p:nvPicPr>
         <p:blipFill>
-          <a:blip r:embed="rId8"/>
+          <a:blip r:embed="rId8">
+            <a:extLst>
+              <a:ext uri="{28A0092B-C50C-407E-A947-70E740481C1C}">
+                <a14:useLocalDpi xmlns:a14="http://schemas.microsoft.com/office/drawing/2010/main" val="0"/>
+              </a:ext>
+            </a:extLst>
+          </a:blip>
           <a:stretch>
             <a:fillRect/>
           </a:stretch>
         </p:blipFill>
         <p:spPr>
           <a:xfrm>
-            <a:off x="7198049" y="5384117"/>
-            <a:ext cx="5785121" cy="4531105"/>
+            <a:off x="14738506" y="516037"/>
+            <a:ext cx="6058613" cy="3367191"/>
           </a:xfrm>
           <a:prstGeom prst="rect">
             <a:avLst/>
           </a:prstGeom>
         </p:spPr>
       </p:pic>
-      <p:sp>
-        <p:nvSpPr>
-          <p:cNvPr id="49" name="ZoneTexte 48">
+      <p:pic>
+        <p:nvPicPr>
+          <p:cNvPr id="53" name="Image 52">
             <a:extLst>
               <a:ext uri="{FF2B5EF4-FFF2-40B4-BE49-F238E27FC236}">
-                <a16:creationId xmlns:a16="http://schemas.microsoft.com/office/drawing/2014/main" id="{04096620-DD58-45B8-87C9-E4C58D7702C8}"/>
+                <a16:creationId xmlns:a16="http://schemas.microsoft.com/office/drawing/2014/main" id="{B64210FD-C202-434A-BC9A-AD5CF2E459D5}"/>
               </a:ext>
             </a:extLst>
           </p:cNvPr>
-          <p:cNvSpPr txBox="1"/>
-          <p:nvPr/>
-        </p:nvSpPr>
-        <p:spPr>
-          <a:xfrm>
-            <a:off x="7160332" y="9912651"/>
-            <a:ext cx="4992624" cy="1908215"/>
-          </a:xfrm>
-          <a:prstGeom prst="rect">
-            <a:avLst/>
-          </a:prstGeom>
-          <a:noFill/>
-        </p:spPr>
-        <p:txBody>
-          <a:bodyPr wrap="square" rtlCol="0">
-            <a:spAutoFit/>
-          </a:bodyPr>
-          <a:lstStyle/>
-          <a:p>
-            <a:r>
-              <a:rPr lang="fr-FR" sz="2800" b="1" dirty="0">
-                <a:latin typeface="Calibri" panose="020F0502020204030204" pitchFamily="34" charset="0"/>
-                <a:cs typeface="Calibri" panose="020F0502020204030204" pitchFamily="34" charset="0"/>
-              </a:rPr>
-              <a:t>4. Les droits</a:t>
-            </a:r>
-          </a:p>
-          <a:p>
-            <a:endParaRPr lang="fr-FR" dirty="0">
-              <a:latin typeface="Calibri" panose="020F0502020204030204" pitchFamily="34" charset="0"/>
-              <a:cs typeface="Calibri" panose="020F0502020204030204" pitchFamily="34" charset="0"/>
-            </a:endParaRPr>
-          </a:p>
-          <a:p>
-            <a:r>
-              <a:rPr lang="fr-FR" dirty="0">
-                <a:latin typeface="Calibri" panose="020F0502020204030204" pitchFamily="34" charset="0"/>
-                <a:cs typeface="Calibri" panose="020F0502020204030204" pitchFamily="34" charset="0"/>
-              </a:rPr>
-              <a:t>Il existe 3 types de comptes utilisateur:</a:t>
-            </a:r>
-          </a:p>
-          <a:p>
-            <a:pPr marL="285750" indent="-285750">
-              <a:buFont typeface="Arial" panose="020B0604020202020204" pitchFamily="34" charset="0"/>
-              <a:buChar char="•"/>
-            </a:pPr>
-            <a:r>
-              <a:rPr lang="fr-FR" dirty="0" err="1">
-                <a:latin typeface="Calibri" panose="020F0502020204030204" pitchFamily="34" charset="0"/>
-                <a:cs typeface="Calibri" panose="020F0502020204030204" pitchFamily="34" charset="0"/>
-              </a:rPr>
-              <a:t>Adminitrateur</a:t>
-            </a:r>
-            <a:endParaRPr lang="fr-FR" dirty="0">
-              <a:latin typeface="Calibri" panose="020F0502020204030204" pitchFamily="34" charset="0"/>
-              <a:cs typeface="Calibri" panose="020F0502020204030204" pitchFamily="34" charset="0"/>
-            </a:endParaRPr>
-          </a:p>
-          <a:p>
-            <a:pPr marL="285750" indent="-285750">
-              <a:buFont typeface="Arial" panose="020B0604020202020204" pitchFamily="34" charset="0"/>
-              <a:buChar char="•"/>
-            </a:pPr>
-            <a:r>
-              <a:rPr lang="fr-FR" dirty="0">
-                <a:latin typeface="Calibri" panose="020F0502020204030204" pitchFamily="34" charset="0"/>
-                <a:cs typeface="Calibri" panose="020F0502020204030204" pitchFamily="34" charset="0"/>
-              </a:rPr>
-              <a:t>Professeur</a:t>
-            </a:r>
-          </a:p>
-          <a:p>
-            <a:pPr marL="285750" indent="-285750">
-              <a:buFont typeface="Arial" panose="020B0604020202020204" pitchFamily="34" charset="0"/>
-              <a:buChar char="•"/>
-            </a:pPr>
-            <a:r>
-              <a:rPr lang="fr-FR" dirty="0">
-                <a:latin typeface="Calibri" panose="020F0502020204030204" pitchFamily="34" charset="0"/>
-                <a:cs typeface="Calibri" panose="020F0502020204030204" pitchFamily="34" charset="0"/>
-              </a:rPr>
-              <a:t>Etudiant</a:t>
-            </a:r>
-          </a:p>
-        </p:txBody>
-      </p:sp>
-      <p:sp>
-        <p:nvSpPr>
-          <p:cNvPr id="51" name="ZoneTexte 50">
-            <a:extLst>
-              <a:ext uri="{FF2B5EF4-FFF2-40B4-BE49-F238E27FC236}">
-                <a16:creationId xmlns:a16="http://schemas.microsoft.com/office/drawing/2014/main" id="{938FE817-A0CB-4537-8BF5-F0C5DE085F93}"/>
-              </a:ext>
-            </a:extLst>
-          </p:cNvPr>
-          <p:cNvSpPr txBox="1"/>
-          <p:nvPr/>
-        </p:nvSpPr>
-        <p:spPr>
-          <a:xfrm>
-            <a:off x="14036842" y="2647476"/>
-            <a:ext cx="6272463" cy="3016210"/>
-          </a:xfrm>
-          <a:prstGeom prst="rect">
-            <a:avLst/>
-          </a:prstGeom>
-          <a:noFill/>
-        </p:spPr>
-        <p:txBody>
-          <a:bodyPr wrap="square" rtlCol="0">
-            <a:spAutoFit/>
-          </a:bodyPr>
-          <a:lstStyle/>
-          <a:p>
-            <a:r>
-              <a:rPr lang="fr-FR" sz="2800" b="1" dirty="0">
-                <a:latin typeface="Calibri" panose="020F0502020204030204" pitchFamily="34" charset="0"/>
-                <a:cs typeface="Calibri" panose="020F0502020204030204" pitchFamily="34" charset="0"/>
-              </a:rPr>
-              <a:t>5. Résultat</a:t>
-            </a:r>
-          </a:p>
-          <a:p>
-            <a:endParaRPr lang="fr-FR" dirty="0">
-              <a:latin typeface="Calibri" panose="020F0502020204030204" pitchFamily="34" charset="0"/>
-              <a:cs typeface="Calibri" panose="020F0502020204030204" pitchFamily="34" charset="0"/>
-            </a:endParaRPr>
-          </a:p>
-          <a:p>
-            <a:pPr algn="just"/>
-            <a:r>
-              <a:rPr lang="fr-FR" dirty="0">
-                <a:latin typeface="Calibri" panose="020F0502020204030204" pitchFamily="34" charset="0"/>
-                <a:cs typeface="Calibri" panose="020F0502020204030204" pitchFamily="34" charset="0"/>
-              </a:rPr>
-              <a:t>	Notre application web comporte plusieurs pages ayant des fonctions pour effectuer chacun des points précisés dans le cahier des charges voire plus. </a:t>
-            </a:r>
-          </a:p>
-          <a:p>
-            <a:endParaRPr lang="fr-FR" dirty="0">
-              <a:latin typeface="Calibri" panose="020F0502020204030204" pitchFamily="34" charset="0"/>
-              <a:cs typeface="Calibri" panose="020F0502020204030204" pitchFamily="34" charset="0"/>
-            </a:endParaRPr>
-          </a:p>
-          <a:p>
-            <a:pPr marL="285750" indent="-285750">
-              <a:buFont typeface="Arial" panose="020B0604020202020204" pitchFamily="34" charset="0"/>
-              <a:buChar char="•"/>
-            </a:pPr>
-            <a:r>
-              <a:rPr lang="fr-FR" dirty="0">
-                <a:latin typeface="Calibri" panose="020F0502020204030204" pitchFamily="34" charset="0"/>
-                <a:cs typeface="Calibri" panose="020F0502020204030204" pitchFamily="34" charset="0"/>
-              </a:rPr>
-              <a:t>Accueil : Historique des modifications</a:t>
-            </a:r>
-          </a:p>
-          <a:p>
-            <a:pPr marL="285750" indent="-285750">
-              <a:buFont typeface="Arial" panose="020B0604020202020204" pitchFamily="34" charset="0"/>
-              <a:buChar char="•"/>
-            </a:pPr>
-            <a:r>
-              <a:rPr lang="fr-FR" dirty="0">
-                <a:latin typeface="Calibri" panose="020F0502020204030204" pitchFamily="34" charset="0"/>
-                <a:cs typeface="Calibri" panose="020F0502020204030204" pitchFamily="34" charset="0"/>
-              </a:rPr>
-              <a:t>Stock : Accès à la liste des produits en stock</a:t>
-            </a:r>
-          </a:p>
-          <a:p>
-            <a:pPr marL="285750" indent="-285750">
-              <a:buFont typeface="Arial" panose="020B0604020202020204" pitchFamily="34" charset="0"/>
-              <a:buChar char="•"/>
-            </a:pPr>
-            <a:r>
-              <a:rPr lang="fr-FR" dirty="0">
-                <a:latin typeface="Calibri" panose="020F0502020204030204" pitchFamily="34" charset="0"/>
-                <a:cs typeface="Calibri" panose="020F0502020204030204" pitchFamily="34" charset="0"/>
-              </a:rPr>
-              <a:t>Tutoriel : Documentation du site</a:t>
-            </a:r>
-          </a:p>
-          <a:p>
-            <a:pPr marL="285750" indent="-285750">
-              <a:buFont typeface="Arial" panose="020B0604020202020204" pitchFamily="34" charset="0"/>
-              <a:buChar char="•"/>
-            </a:pPr>
-            <a:r>
-              <a:rPr lang="fr-FR" dirty="0">
-                <a:latin typeface="Calibri" panose="020F0502020204030204" pitchFamily="34" charset="0"/>
-                <a:cs typeface="Calibri" panose="020F0502020204030204" pitchFamily="34" charset="0"/>
-              </a:rPr>
-              <a:t>Utilisateurs : Gestion des utilisateurs</a:t>
-            </a:r>
-          </a:p>
-        </p:txBody>
-      </p:sp>
-      <p:pic>
-        <p:nvPicPr>
-          <p:cNvPr id="55" name="Image 54">
-            <a:extLst>
-              <a:ext uri="{FF2B5EF4-FFF2-40B4-BE49-F238E27FC236}">
-                <a16:creationId xmlns:a16="http://schemas.microsoft.com/office/drawing/2014/main" id="{A1A89E08-B875-44C8-AF9A-14B5D3A44699}"/>
-              </a:ext>
-            </a:extLst>
-          </p:cNvPr>
-          <p:cNvPicPr/>
+          <p:cNvPicPr>
+            <a:picLocks noChangeAspect="1"/>
+          </p:cNvPicPr>
           <p:nvPr/>
         </p:nvPicPr>
         <p:blipFill>
@@ -9939,8 +7443,8 @@
         </p:blipFill>
         <p:spPr>
           <a:xfrm>
-            <a:off x="14036842" y="5753208"/>
-            <a:ext cx="4954668" cy="2753652"/>
+            <a:off x="14789622" y="4062198"/>
+            <a:ext cx="6007497" cy="4111797"/>
           </a:xfrm>
           <a:prstGeom prst="rect">
             <a:avLst/>
@@ -9949,14 +7453,16 @@
       </p:pic>
       <p:pic>
         <p:nvPicPr>
-          <p:cNvPr id="53" name="Image 52">
+          <p:cNvPr id="57" name="Image 56">
             <a:extLst>
               <a:ext uri="{FF2B5EF4-FFF2-40B4-BE49-F238E27FC236}">
-                <a16:creationId xmlns:a16="http://schemas.microsoft.com/office/drawing/2014/main" id="{B64210FD-C202-434A-BC9A-AD5CF2E459D5}"/>
+                <a16:creationId xmlns:a16="http://schemas.microsoft.com/office/drawing/2014/main" id="{9D69D4DA-B551-4BE7-BBF0-A346862D5F19}"/>
               </a:ext>
             </a:extLst>
           </p:cNvPr>
-          <p:cNvPicPr/>
+          <p:cNvPicPr>
+            <a:picLocks noChangeAspect="1"/>
+          </p:cNvPicPr>
           <p:nvPr/>
         </p:nvPicPr>
         <p:blipFill>
@@ -9973,95 +7479,8 @@
         </p:blipFill>
         <p:spPr>
           <a:xfrm>
-            <a:off x="14036842" y="8660505"/>
-            <a:ext cx="4954668" cy="3391194"/>
-          </a:xfrm>
-          <a:prstGeom prst="rect">
-            <a:avLst/>
-          </a:prstGeom>
-        </p:spPr>
-      </p:pic>
-      <p:sp>
-        <p:nvSpPr>
-          <p:cNvPr id="56" name="ZoneTexte 55">
-            <a:extLst>
-              <a:ext uri="{FF2B5EF4-FFF2-40B4-BE49-F238E27FC236}">
-                <a16:creationId xmlns:a16="http://schemas.microsoft.com/office/drawing/2014/main" id="{44A01F0A-B6AF-4D9E-A5F3-D65F56EC4D58}"/>
-              </a:ext>
-            </a:extLst>
-          </p:cNvPr>
-          <p:cNvSpPr txBox="1"/>
-          <p:nvPr/>
-        </p:nvSpPr>
-        <p:spPr>
-          <a:xfrm>
-            <a:off x="7663413" y="12136535"/>
-            <a:ext cx="4591070" cy="2185214"/>
-          </a:xfrm>
-          <a:prstGeom prst="rect">
-            <a:avLst/>
-          </a:prstGeom>
-          <a:noFill/>
-        </p:spPr>
-        <p:txBody>
-          <a:bodyPr wrap="square" rtlCol="0">
-            <a:spAutoFit/>
-          </a:bodyPr>
-          <a:lstStyle/>
-          <a:p>
-            <a:r>
-              <a:rPr lang="fr-FR" sz="2800" b="1" dirty="0">
-                <a:latin typeface="Calibri" panose="020F0502020204030204" pitchFamily="34" charset="0"/>
-                <a:cs typeface="Calibri" panose="020F0502020204030204" pitchFamily="34" charset="0"/>
-              </a:rPr>
-              <a:t>6. La fonction Scanner</a:t>
-            </a:r>
-          </a:p>
-          <a:p>
-            <a:endParaRPr lang="fr-FR" dirty="0">
-              <a:latin typeface="Calibri" panose="020F0502020204030204" pitchFamily="34" charset="0"/>
-              <a:cs typeface="Calibri" panose="020F0502020204030204" pitchFamily="34" charset="0"/>
-            </a:endParaRPr>
-          </a:p>
-          <a:p>
-            <a:r>
-              <a:rPr lang="fr-FR" dirty="0">
-                <a:latin typeface="Calibri" panose="020F0502020204030204" pitchFamily="34" charset="0"/>
-                <a:cs typeface="Calibri" panose="020F0502020204030204" pitchFamily="34" charset="0"/>
-              </a:rPr>
-              <a:t>	Nous avons développé une fonction qui permet, quand c’est possible, d’ouvrir la caméra et de scanner un code-barres pour soit rechercher une produit, soit pour l’ajouter au Stock</a:t>
-            </a:r>
-          </a:p>
-        </p:txBody>
-      </p:sp>
-      <p:pic>
-        <p:nvPicPr>
-          <p:cNvPr id="57" name="Image 56">
-            <a:extLst>
-              <a:ext uri="{FF2B5EF4-FFF2-40B4-BE49-F238E27FC236}">
-                <a16:creationId xmlns:a16="http://schemas.microsoft.com/office/drawing/2014/main" id="{9D69D4DA-B551-4BE7-BBF0-A346862D5F19}"/>
-              </a:ext>
-            </a:extLst>
-          </p:cNvPr>
-          <p:cNvPicPr/>
-          <p:nvPr/>
-        </p:nvPicPr>
-        <p:blipFill>
-          <a:blip r:embed="rId11">
-            <a:extLst>
-              <a:ext uri="{28A0092B-C50C-407E-A947-70E740481C1C}">
-                <a14:useLocalDpi xmlns:a14="http://schemas.microsoft.com/office/drawing/2010/main" val="0"/>
-              </a:ext>
-            </a:extLst>
-          </a:blip>
-          <a:stretch>
-            <a:fillRect/>
-          </a:stretch>
-        </p:blipFill>
-        <p:spPr>
-          <a:xfrm>
-            <a:off x="14036842" y="12304735"/>
-            <a:ext cx="4954668" cy="2071872"/>
+            <a:off x="14789622" y="8364252"/>
+            <a:ext cx="6058209" cy="2533335"/>
           </a:xfrm>
           <a:prstGeom prst="rect">
             <a:avLst/>
@@ -10126,6 +7545,335 @@
           </a:p>
         </p:txBody>
       </p:sp>
+      <p:grpSp>
+        <p:nvGrpSpPr>
+          <p:cNvPr id="29" name="Groupe 28">
+            <a:extLst>
+              <a:ext uri="{FF2B5EF4-FFF2-40B4-BE49-F238E27FC236}">
+                <a16:creationId xmlns:a16="http://schemas.microsoft.com/office/drawing/2014/main" id="{C6EF8CAB-8572-4468-B2A0-FA2C0DAA16AD}"/>
+              </a:ext>
+            </a:extLst>
+          </p:cNvPr>
+          <p:cNvGrpSpPr/>
+          <p:nvPr/>
+        </p:nvGrpSpPr>
+        <p:grpSpPr>
+          <a:xfrm>
+            <a:off x="14512266" y="11495121"/>
+            <a:ext cx="6562208" cy="2288246"/>
+            <a:chOff x="7160332" y="12294168"/>
+            <a:chExt cx="6562208" cy="2288246"/>
+          </a:xfrm>
+        </p:grpSpPr>
+        <p:pic>
+          <p:nvPicPr>
+            <p:cNvPr id="1026" name="Picture 2" descr="RÃ©sultat de recherche d'images pour &quot;code barres&quot;">
+              <a:extLst>
+                <a:ext uri="{FF2B5EF4-FFF2-40B4-BE49-F238E27FC236}">
+                  <a16:creationId xmlns:a16="http://schemas.microsoft.com/office/drawing/2014/main" id="{AAD8237E-1321-4D41-AE95-46E2B2C1A666}"/>
+                </a:ext>
+              </a:extLst>
+            </p:cNvPr>
+            <p:cNvPicPr>
+              <a:picLocks noChangeAspect="1" noChangeArrowheads="1"/>
+            </p:cNvPicPr>
+            <p:nvPr/>
+          </p:nvPicPr>
+          <p:blipFill>
+            <a:blip r:embed="rId11">
+              <a:extLst>
+                <a:ext uri="{28A0092B-C50C-407E-A947-70E740481C1C}">
+                  <a14:useLocalDpi xmlns:a14="http://schemas.microsoft.com/office/drawing/2010/main" val="0"/>
+                </a:ext>
+              </a:extLst>
+            </a:blip>
+            <a:srcRect/>
+            <a:stretch>
+              <a:fillRect/>
+            </a:stretch>
+          </p:blipFill>
+          <p:spPr bwMode="auto">
+            <a:xfrm>
+              <a:off x="11490432" y="12962276"/>
+              <a:ext cx="2232108" cy="1620138"/>
+            </a:xfrm>
+            <a:prstGeom prst="rect">
+              <a:avLst/>
+            </a:prstGeom>
+            <a:noFill/>
+            <a:extLst>
+              <a:ext uri="{909E8E84-426E-40DD-AFC4-6F175D3DCCD1}">
+                <a14:hiddenFill xmlns:a14="http://schemas.microsoft.com/office/drawing/2010/main">
+                  <a:solidFill>
+                    <a:srgbClr val="FFFFFF"/>
+                  </a:solidFill>
+                </a14:hiddenFill>
+              </a:ext>
+            </a:extLst>
+          </p:spPr>
+        </p:pic>
+        <p:sp>
+          <p:nvSpPr>
+            <p:cNvPr id="56" name="ZoneTexte 55">
+              <a:extLst>
+                <a:ext uri="{FF2B5EF4-FFF2-40B4-BE49-F238E27FC236}">
+                  <a16:creationId xmlns:a16="http://schemas.microsoft.com/office/drawing/2014/main" id="{44A01F0A-B6AF-4D9E-A5F3-D65F56EC4D58}"/>
+                </a:ext>
+              </a:extLst>
+            </p:cNvPr>
+            <p:cNvSpPr txBox="1"/>
+            <p:nvPr/>
+          </p:nvSpPr>
+          <p:spPr>
+            <a:xfrm>
+              <a:off x="7160332" y="12294168"/>
+              <a:ext cx="4330100" cy="2185214"/>
+            </a:xfrm>
+            <a:prstGeom prst="rect">
+              <a:avLst/>
+            </a:prstGeom>
+            <a:noFill/>
+          </p:spPr>
+          <p:txBody>
+            <a:bodyPr wrap="square" rtlCol="0">
+              <a:spAutoFit/>
+            </a:bodyPr>
+            <a:lstStyle/>
+            <a:p>
+              <a:r>
+                <a:rPr lang="fr-FR" sz="2800" b="1" dirty="0">
+                  <a:latin typeface="Calibri" panose="020F0502020204030204" pitchFamily="34" charset="0"/>
+                  <a:cs typeface="Calibri" panose="020F0502020204030204" pitchFamily="34" charset="0"/>
+                </a:rPr>
+                <a:t>6. La fonction Scanner</a:t>
+              </a:r>
+            </a:p>
+            <a:p>
+              <a:endParaRPr lang="fr-FR" dirty="0">
+                <a:latin typeface="Calibri" panose="020F0502020204030204" pitchFamily="34" charset="0"/>
+                <a:cs typeface="Calibri" panose="020F0502020204030204" pitchFamily="34" charset="0"/>
+              </a:endParaRPr>
+            </a:p>
+            <a:p>
+              <a:pPr algn="just"/>
+              <a:r>
+                <a:rPr lang="fr-FR" dirty="0">
+                  <a:latin typeface="Calibri" panose="020F0502020204030204" pitchFamily="34" charset="0"/>
+                  <a:cs typeface="Calibri" panose="020F0502020204030204" pitchFamily="34" charset="0"/>
+                </a:rPr>
+                <a:t>	Nous avons développé une fonction qui permet, quand c’est possible, d’ouvrir la caméra et de scanner un code-barres pour soit rechercher une produit, soit pour l’ajouter au Stock</a:t>
+              </a:r>
+            </a:p>
+          </p:txBody>
+        </p:sp>
+        <p:sp>
+          <p:nvSpPr>
+            <p:cNvPr id="3" name="ZoneTexte 2">
+              <a:extLst>
+                <a:ext uri="{FF2B5EF4-FFF2-40B4-BE49-F238E27FC236}">
+                  <a16:creationId xmlns:a16="http://schemas.microsoft.com/office/drawing/2014/main" id="{D0BF1029-595B-465A-BDBC-9E21940A4598}"/>
+                </a:ext>
+              </a:extLst>
+            </p:cNvPr>
+            <p:cNvSpPr txBox="1"/>
+            <p:nvPr/>
+          </p:nvSpPr>
+          <p:spPr>
+            <a:xfrm>
+              <a:off x="11670528" y="12650407"/>
+              <a:ext cx="1871916" cy="307777"/>
+            </a:xfrm>
+            <a:prstGeom prst="rect">
+              <a:avLst/>
+            </a:prstGeom>
+            <a:noFill/>
+          </p:spPr>
+          <p:txBody>
+            <a:bodyPr wrap="square" rtlCol="0">
+              <a:spAutoFit/>
+            </a:bodyPr>
+            <a:lstStyle/>
+            <a:p>
+              <a:pPr algn="ctr"/>
+              <a:r>
+                <a:rPr lang="fr-FR" sz="1400" i="1" dirty="0">
+                  <a:solidFill>
+                    <a:schemeClr val="bg1">
+                      <a:lumMod val="65000"/>
+                    </a:schemeClr>
+                  </a:solidFill>
+                </a:rPr>
+                <a:t>Un essai?</a:t>
+              </a:r>
+            </a:p>
+          </p:txBody>
+        </p:sp>
+      </p:grpSp>
+      <p:grpSp>
+        <p:nvGrpSpPr>
+          <p:cNvPr id="30" name="Groupe 29">
+            <a:extLst>
+              <a:ext uri="{FF2B5EF4-FFF2-40B4-BE49-F238E27FC236}">
+                <a16:creationId xmlns:a16="http://schemas.microsoft.com/office/drawing/2014/main" id="{6B38691D-3684-4711-8F8C-8E3F6E5E9788}"/>
+              </a:ext>
+            </a:extLst>
+          </p:cNvPr>
+          <p:cNvGrpSpPr/>
+          <p:nvPr/>
+        </p:nvGrpSpPr>
+        <p:grpSpPr>
+          <a:xfrm>
+            <a:off x="7425241" y="5075791"/>
+            <a:ext cx="5557929" cy="4709018"/>
+            <a:chOff x="7425241" y="5386687"/>
+            <a:chExt cx="5557929" cy="4709018"/>
+          </a:xfrm>
+        </p:grpSpPr>
+        <p:pic>
+          <p:nvPicPr>
+            <p:cNvPr id="48" name="Image 47">
+              <a:extLst>
+                <a:ext uri="{FF2B5EF4-FFF2-40B4-BE49-F238E27FC236}">
+                  <a16:creationId xmlns:a16="http://schemas.microsoft.com/office/drawing/2014/main" id="{97F171C5-E990-473F-8296-2761BF0BB249}"/>
+                </a:ext>
+              </a:extLst>
+            </p:cNvPr>
+            <p:cNvPicPr>
+              <a:picLocks noChangeAspect="1"/>
+            </p:cNvPicPr>
+            <p:nvPr/>
+          </p:nvPicPr>
+          <p:blipFill>
+            <a:blip r:embed="rId12"/>
+            <a:stretch>
+              <a:fillRect/>
+            </a:stretch>
+          </p:blipFill>
+          <p:spPr>
+            <a:xfrm>
+              <a:off x="9813406" y="5553145"/>
+              <a:ext cx="3169764" cy="3903768"/>
+            </a:xfrm>
+            <a:prstGeom prst="rect">
+              <a:avLst/>
+            </a:prstGeom>
+          </p:spPr>
+        </p:pic>
+        <p:pic>
+          <p:nvPicPr>
+            <p:cNvPr id="27" name="Image 26">
+              <a:extLst>
+                <a:ext uri="{FF2B5EF4-FFF2-40B4-BE49-F238E27FC236}">
+                  <a16:creationId xmlns:a16="http://schemas.microsoft.com/office/drawing/2014/main" id="{0D140CC3-FC2D-4866-AEE2-AF6FCFDE9478}"/>
+                </a:ext>
+              </a:extLst>
+            </p:cNvPr>
+            <p:cNvPicPr>
+              <a:picLocks noChangeAspect="1"/>
+            </p:cNvPicPr>
+            <p:nvPr/>
+          </p:nvPicPr>
+          <p:blipFill>
+            <a:blip r:embed="rId13"/>
+            <a:stretch>
+              <a:fillRect/>
+            </a:stretch>
+          </p:blipFill>
+          <p:spPr>
+            <a:xfrm>
+              <a:off x="7425241" y="5386687"/>
+              <a:ext cx="1954806" cy="4401241"/>
+            </a:xfrm>
+            <a:prstGeom prst="rect">
+              <a:avLst/>
+            </a:prstGeom>
+          </p:spPr>
+        </p:pic>
+        <p:sp>
+          <p:nvSpPr>
+            <p:cNvPr id="39" name="ZoneTexte 38">
+              <a:extLst>
+                <a:ext uri="{FF2B5EF4-FFF2-40B4-BE49-F238E27FC236}">
+                  <a16:creationId xmlns:a16="http://schemas.microsoft.com/office/drawing/2014/main" id="{310E9D1C-A699-41F6-B2A3-A1948D9B8DA3}"/>
+                </a:ext>
+              </a:extLst>
+            </p:cNvPr>
+            <p:cNvSpPr txBox="1"/>
+            <p:nvPr/>
+          </p:nvSpPr>
+          <p:spPr>
+            <a:xfrm>
+              <a:off x="7468007" y="9787928"/>
+              <a:ext cx="1871916" cy="307777"/>
+            </a:xfrm>
+            <a:prstGeom prst="rect">
+              <a:avLst/>
+            </a:prstGeom>
+            <a:noFill/>
+          </p:spPr>
+          <p:txBody>
+            <a:bodyPr wrap="square" rtlCol="0">
+              <a:spAutoFit/>
+            </a:bodyPr>
+            <a:lstStyle/>
+            <a:p>
+              <a:pPr algn="ctr"/>
+              <a:r>
+                <a:rPr lang="fr-FR" sz="1400" i="1" dirty="0">
+                  <a:solidFill>
+                    <a:schemeClr val="bg1">
+                      <a:lumMod val="65000"/>
+                    </a:schemeClr>
+                  </a:solidFill>
+                </a:rPr>
+                <a:t>Ancienne structure</a:t>
+              </a:r>
+            </a:p>
+          </p:txBody>
+        </p:sp>
+        <p:sp>
+          <p:nvSpPr>
+            <p:cNvPr id="40" name="ZoneTexte 39">
+              <a:extLst>
+                <a:ext uri="{FF2B5EF4-FFF2-40B4-BE49-F238E27FC236}">
+                  <a16:creationId xmlns:a16="http://schemas.microsoft.com/office/drawing/2014/main" id="{49BC98D7-32D9-408A-BD03-4ABCA44E1FDB}"/>
+                </a:ext>
+              </a:extLst>
+            </p:cNvPr>
+            <p:cNvSpPr txBox="1"/>
+            <p:nvPr/>
+          </p:nvSpPr>
+          <p:spPr>
+            <a:xfrm>
+              <a:off x="10462330" y="9513188"/>
+              <a:ext cx="1871916" cy="307777"/>
+            </a:xfrm>
+            <a:prstGeom prst="rect">
+              <a:avLst/>
+            </a:prstGeom>
+            <a:noFill/>
+          </p:spPr>
+          <p:txBody>
+            <a:bodyPr wrap="square" rtlCol="0">
+              <a:spAutoFit/>
+            </a:bodyPr>
+            <a:lstStyle/>
+            <a:p>
+              <a:pPr algn="ctr"/>
+              <a:r>
+                <a:rPr lang="fr-FR" sz="1400" i="1" dirty="0">
+                  <a:solidFill>
+                    <a:schemeClr val="bg1">
+                      <a:lumMod val="65000"/>
+                    </a:schemeClr>
+                  </a:solidFill>
+                </a:rPr>
+                <a:t>Nouvelle structure</a:t>
+              </a:r>
+            </a:p>
+          </p:txBody>
+        </p:sp>
+      </p:grpSp>
     </p:spTree>
     <p:extLst>
       <p:ext uri="{BB962C8B-B14F-4D97-AF65-F5344CB8AC3E}">

</xml_diff>